<commit_message>
fixing student gradebook examples
</commit_message>
<xml_diff>
--- a/ClassMaterials/MapsAndObjectIntro/Slides/Part1-ObjectIntro.pptx
+++ b/ClassMaterials/MapsAndObjectIntro/Slides/Part1-ObjectIntro.pptx
@@ -5,7 +5,7 @@
     <p:sldMasterId id="2147483648" r:id="rId4"/>
   </p:sldMasterIdLst>
   <p:notesMasterIdLst>
-    <p:notesMasterId r:id="rId17"/>
+    <p:notesMasterId r:id="rId15"/>
   </p:notesMasterIdLst>
   <p:sldIdLst>
     <p:sldId id="256" r:id="rId5"/>
@@ -18,8 +18,6 @@
     <p:sldId id="295" r:id="rId12"/>
     <p:sldId id="296" r:id="rId13"/>
     <p:sldId id="309" r:id="rId14"/>
-    <p:sldId id="327" r:id="rId15"/>
-    <p:sldId id="322" r:id="rId16"/>
   </p:sldIdLst>
   <p:sldSz cx="9144000" cy="6858000" type="screen4x3"/>
   <p:notesSz cx="6858000" cy="9144000"/>
@@ -560,15 +558,15 @@
           <inkml:channelProperty channel="F" name="resolution" value="0" units="1/dev"/>
         </inkml:channelProperties>
       </inkml:inkSource>
-      <inkml:timestamp xml:id="ts0" timeString="2022-12-05T00:03:36.019"/>
+      <inkml:timestamp xml:id="ts0" timeString="2025-03-03T18:17:30.074"/>
     </inkml:context>
     <inkml:brush xml:id="br0">
-      <inkml:brushProperty name="width" value="0.05" units="cm"/>
-      <inkml:brushProperty name="height" value="0.05" units="cm"/>
+      <inkml:brushProperty name="width" value="0.1" units="cm"/>
+      <inkml:brushProperty name="height" value="0.1" units="cm"/>
       <inkml:brushProperty name="color" value="#E71224"/>
     </inkml:brush>
   </inkml:definitions>
-  <inkml:trace contextRef="#ctx0" brushRef="#br0">1 2 24575,'50'0'0,"78"-1"0,0 5 0,171 27 0,192 35 0,168-32 0,-596-28 0,92 20 0,-95-13 0,91 6 0,76-17 0,-123-4 0,126 15 0,-200-10 0,39 6 0,1 2 0,67 21 0,-95-21 0,0-2 0,1-2 0,72 3 0,136-12 0,-93-1 0,77 4 0,246-3 0,-404-3 0,-1-3 0,0-4 0,105-29 0,-109 24 0,1 4 0,106-5 0,-50 6 0,514-28 0,-558 39 0,117-16 0,-57 4 0,231 10 0,-184 6 0,1088-3 0,-1032 17 0,14 0 0,1058-19 0,-1110-14 0,7-2 0,-98 17-55,-33-1-600,126 13 0,-167-4-6171</inkml:trace>
+  <inkml:trace contextRef="#ctx0" brushRef="#br0">2009 757 24575,'-1183'0'0,"1126"-2"0,0-2 0,0-4 0,-76-18 0,-162-61 0,261 76 0,16 6 0,0-1 0,0-1 0,1-1 0,0 0 0,0-2 0,-20-14 0,33 21 0,-1-1 0,1 1 0,1-1 0,-1 0 0,0 0 0,1-1 0,0 1 0,0-1 0,0 0 0,1 1 0,0-1 0,-1 0 0,2-1 0,-1 1 0,1 0 0,-1 0 0,1-1 0,1 1 0,-1-1 0,1 1 0,0-1 0,0 1 0,1 0 0,0-1 0,0 1 0,2-8 0,1 0 0,0 1 0,1 0 0,0 0 0,1 0 0,0 1 0,1 0 0,0 0 0,1 1 0,12-14 0,-6 10 0,1 0 0,1 1 0,0 1 0,0 1 0,28-15 0,-4 7 0,1 2 0,0 2 0,1 2 0,81-15 0,-70 20 0,93 1 0,7-1 0,271-8 0,-146 13 0,-115-15 0,-63 5 0,-18 4 0,161-11 0,587 19 0,-388 3 0,-398-1 0,60 12 0,10 0 0,-83-12 0,0 0 0,1 1 0,-1 1 0,1 1 0,-1 2 0,0 2 0,32 11 0,-15-1 0,0-3 0,92 18 0,105 0 0,-227-31 0,32 3 0,0 3 0,71 20 0,-72-15 0,-28-8 0,0 1 0,-1 1 0,0 1 0,27 14 0,-41-18 0,-1 0 0,1-1 0,-1 2 0,0-1 0,0 0 0,-1 1 0,0 0 0,1 0 0,-2 1 0,1-1 0,-1 1 0,1-1 0,-1 1 0,-1 0 0,1 0 0,-1 1 0,0-1 0,1 13 0,-1-11 0,-1 0 0,0 0 0,-1 0 0,0 0 0,0 1 0,-1-1 0,0 0 0,0 0 0,-1 0 0,0 0 0,0-1 0,-1 1 0,0 0 0,-1-1 0,1 0 0,-1 0 0,-1 0 0,1 0 0,-1-1 0,0 1 0,-1-1 0,0-1 0,0 1 0,0-1 0,0 0 0,-1 0 0,0-1 0,0 0 0,0 0 0,0 0 0,-13 3 0,-47 16 0,-1-4 0,0-3 0,-1-2 0,-113 6 0,-289-14 0,275-9 0,-1653 3-1365,1816 0-5461</inkml:trace>
 </inkml:ink>
 </file>
 
@@ -588,15 +586,43 @@
           <inkml:channelProperty channel="F" name="resolution" value="0" units="1/dev"/>
         </inkml:channelProperties>
       </inkml:inkSource>
-      <inkml:timestamp xml:id="ts0" timeString="2022-12-05T00:04:01.813"/>
+      <inkml:timestamp xml:id="ts0" timeString="2025-03-03T18:17:34.118"/>
     </inkml:context>
     <inkml:brush xml:id="br0">
-      <inkml:brushProperty name="width" value="0.05" units="cm"/>
-      <inkml:brushProperty name="height" value="0.05" units="cm"/>
+      <inkml:brushProperty name="width" value="0.1" units="cm"/>
+      <inkml:brushProperty name="height" value="0.1" units="cm"/>
       <inkml:brushProperty name="color" value="#E71224"/>
     </inkml:brush>
   </inkml:definitions>
-  <inkml:trace contextRef="#ctx0" brushRef="#br0">0 431 24575,'1'-9'0,"1"-1"0,0 1 0,0-1 0,1 1 0,0 0 0,1 0 0,0 0 0,0 0 0,1 1 0,0 0 0,0 0 0,10-11 0,4-5 0,2 2 0,37-33 0,-25 28 0,0 1 0,2 2 0,1 1 0,39-18 0,-51 30 0,1 1 0,0 1 0,1 1 0,0 1 0,0 1 0,1 1 0,38-1 0,291 6 0,-148 2 0,-169-1 0,0 1 0,0 3 0,0 1 0,56 16 0,-55-7 0,-2 2 0,0 1 0,-1 2 0,35 25 0,-34-21 0,0-1 0,2-2 0,63 24 0,-62-31 0,-2 1 0,0 1 0,0 3 0,-2 1 0,0 2 0,38 30 0,123 131 0,-96-82 0,-58-64 0,2-1 0,59 35 0,-62-44 0,0 2 0,-2 2 0,43 42 0,-40-28 0,60 80 0,-6 0 0,32 47 0,-101-126 0,177 249 0,-190-272 0,-1 0 0,0 1 0,13 34 0,-16-32 0,1-1 0,1 0 0,20 26 0,-3-13 0,-2 2 0,-2 2 0,24 48 0,214 474 0,-248-523 0,15 50 0,9 23 0,23 24 0,49 121 0,-25-54 0,-52-129 0,40 128 0,-49-121 0,43 87 0,-43-111 0,-2 2 0,-3 1 0,23 102 0,-31-77 0,33 156 0,85 186 0,-107-342 0,18 124 0,11 40 0,-29-150 0,-15-54 0,23 63 0,-16-63 0,-2 0 0,-3 1 0,-1 1 0,-2 0 0,3 98 0,-5-40 0,5 0 0,31 129 0,-18-110 0,60 231 0,-31-164 0,7 22 0,-42-145 0,-2 1 0,-3 1 0,8 144 0,-22-213 0,9 59 0,2-1 0,39 117 0,-5-20 0,-18-55 0,-11-48 0,-3 1 0,-2 0 0,8 110 0,-23 813 0,11-853 0,5-1 0,31 138 0,-36-228 0,25 164 0,-27-172 0,3 30 0,-7-54 0,-1 0 0,0-1 0,0 1 0,0-1 0,-1 1 0,1-1 0,-1 1 0,1-1 0,-1 1 0,0-1 0,0 0 0,0 1 0,0-1 0,0 0 0,-1 0 0,1 1 0,-3 2 0,3-5 0,0 1 0,0-1 0,0 1 0,0-1 0,0 1 0,-1-1 0,1 0 0,0 1 0,0-1 0,0 0 0,0 0 0,-1 0 0,1 0 0,0 0 0,0 0 0,0 0 0,-1-1 0,1 1 0,0 0 0,0 0 0,0-1 0,0 1 0,0-1 0,-2-1 0,-29-18 0,23 14 0,-71-51 0,-100-93 0,-28-21 0,232 191 0,0 1 0,25 30 0,8 7 0,-10-17 0,1-2 0,1-3 0,106 59 0,-144-89 0,-1-1 0,1 0 0,0-1 0,0 0 0,1 0 0,-1-1 0,1-1 0,13 1 0,-20-3 0,0 0 0,0 0 0,0-1 0,0 0 0,0 0 0,0 0 0,0 0 0,0-1 0,0 0 0,0 0 0,-1 0 0,1-1 0,-1 1 0,1-1 0,-1 0 0,0-1 0,0 1 0,0-1 0,-1 1 0,6-8 0,49-73 0,-42 59 0,1 0 0,2 1 0,34-36 0,-13 24 0,1 2 0,2 2 0,1 2 0,60-31 0,-85 50-455,0-1 0,32-28 0,-32 24-6371</inkml:trace>
+  <inkml:trace contextRef="#ctx0" brushRef="#br0">1693 65 24575,'0'-2'0,"0"0"0,0 0 0,-1-1 0,1 1 0,-1 0 0,1 0 0,-1 0 0,0 0 0,1 0 0,-1 0 0,0 0 0,0 0 0,-1 0 0,1 0 0,0 0 0,-1 0 0,1 1 0,-1-1 0,1 1 0,-1-1 0,0 1 0,0-1 0,0 1 0,0 0 0,0 0 0,0 0 0,0 0 0,0 0 0,-3 0 0,-6-2 0,0 1 0,-1 0 0,1 1 0,-18-1 0,16 2 0,-522-3 0,262 6 0,120-5 0,-171 5 0,298-1 0,0 1 0,-48 13 0,62-13 0,-1 1 0,1 1 0,0 0 0,1 0 0,0 2 0,0-1 0,-20 16 0,27-18 0,0-1 0,1 0 0,0 1 0,0 0 0,0 0 0,0 0 0,0 0 0,1 0 0,0 1 0,-1-1 0,2 1 0,-1-1 0,1 1 0,-1 0 0,1 0 0,-1 9 0,3-6 0,-1-1 0,1 1 0,0-1 0,0 0 0,1 1 0,0-1 0,0 0 0,1 0 0,0 0 0,5 8 0,1 1 0,2 0 0,0-1 0,1 0 0,0-1 0,1 0 0,1-1 0,0-1 0,19 13 0,-1-5 0,1-2 0,1-1 0,69 25 0,113 18 0,-47-25 0,82 22 0,-199-40 0,2-3 0,0-2 0,78 8 0,-16-11 0,193 9 0,623-19 0,-729 18 0,-139-9 0,123 22 0,-108-15 0,132 7 0,-182-21 0,307 16 0,218-4 0,-351-15 0,1096 2 0,-1265-2 0,0-1 0,37-9 0,-32 5 0,-28 5 0,0 0 0,-1 0 0,1-1 0,-1-1 0,0 1 0,0-2 0,0 1 0,-1-2 0,0 1 0,0-1 0,0 0 0,0-1 0,-1 0 0,0-1 0,-1 1 0,1-2 0,-2 1 0,1-1 0,-1 0 0,0 0 0,-1 0 0,0-1 0,-1 0 0,0 0 0,0 0 0,-1-1 0,3-15 0,-2-20 0,-2-1 0,-1 0 0,-7-48 0,5 85 0,-1 1 0,0 1 0,-1-1 0,0 0 0,0 1 0,-1-1 0,0 1 0,-1 0 0,0 0 0,0 1 0,0-1 0,-1 1 0,0 0 0,-12-10 0,-9-6 0,-1 2 0,-44-27 0,59 39 0,-1 1 0,-1 1 0,1 0 0,-1 0 0,0 2 0,-21-6 0,-80-10 0,80 17 0,0-3 0,-43-13 0,44 8 0,0 1 0,-1 2 0,0 1 0,0 2 0,-56-2 0,-738 8 0,326 3 0,-2140-3-1365,2604 0-5461</inkml:trace>
+</inkml:ink>
+</file>
+
+<file path=ppt/ink/ink3.xml><?xml version="1.0" encoding="utf-8"?>
+<inkml:ink xmlns:inkml="http://www.w3.org/2003/InkML">
+  <inkml:definitions>
+    <inkml:context xml:id="ctx0">
+      <inkml:inkSource xml:id="inkSrc0">
+        <inkml:traceFormat>
+          <inkml:channel name="X" type="integer" min="-2.14748E9" max="2.14748E9" units="cm"/>
+          <inkml:channel name="Y" type="integer" min="-2.14748E9" max="2.14748E9" units="cm"/>
+          <inkml:channel name="F" type="integer" max="32767" units="dev"/>
+        </inkml:traceFormat>
+        <inkml:channelProperties>
+          <inkml:channelProperty channel="X" name="resolution" value="1000" units="1/cm"/>
+          <inkml:channelProperty channel="Y" name="resolution" value="1000" units="1/cm"/>
+          <inkml:channelProperty channel="F" name="resolution" value="0" units="1/dev"/>
+        </inkml:channelProperties>
+      </inkml:inkSource>
+      <inkml:timestamp xml:id="ts0" timeString="2025-03-03T18:18:12.187"/>
+    </inkml:context>
+    <inkml:brush xml:id="br0">
+      <inkml:brushProperty name="width" value="0.1" units="cm"/>
+      <inkml:brushProperty name="height" value="0.1" units="cm"/>
+      <inkml:brushProperty name="color" value="#E71224"/>
+    </inkml:brush>
+  </inkml:definitions>
+  <inkml:trace contextRef="#ctx0" brushRef="#br0">5145 2 24575,'-77'0'0,"-403"18"0,310 1 0,-113 15 0,-5-11 0,-3-25 0,90 0 0,5 4 0,-294-10 0,256-23 0,61 6 0,-278-4 0,-763 30 0,1190-1 0,1 2 0,-1 0 0,0 2 0,1 0 0,-1 2 0,-23 9 0,36-11 0,0 0 0,0 1 0,1 0 0,0 1 0,0 0 0,0 1 0,0 0 0,1 0 0,1 1 0,-1 1 0,1-1 0,0 1 0,1 0 0,-8 14 0,-13 30 0,-27 75 0,46-100 0,2 1 0,1 0 0,-2 35 0,3-27 0,-11 47 0,-1-24 0,-13 46 0,-21 144 0,22 168 0,30 5 0,1-166 0,-2-211 0,3-1 0,1 1 0,2-1 0,2 0 0,3 0 0,1-1 0,34 81 0,-24-73 0,3-1 0,37 58 0,-51-93 0,1 0 0,0-1 0,1 0 0,0-1 0,1-1 0,1 0 0,0-1 0,1-1 0,0 0 0,22 10 0,8-1 0,59 17 0,25 10 0,-93-31 0,0-1 0,1-2 0,0-2 0,1-1 0,0-2 0,0-2 0,53 2 0,3-8 0,-49-1 0,-1 1 0,1 3 0,51 9 0,3 6 0,193 9 0,105-27 0,-183-2 0,-58 1 0,374 14 0,295 8 0,-566-23 0,768 2 0,-921-4 0,1-5 0,151-33 0,-38-13 0,-120 27 0,249-79 0,-302 88 0,-1-2 0,-1-2 0,-1-2 0,-1-2 0,44-36 0,-67 45 0,-1-1 0,-1-1 0,-1-1 0,-1-1 0,18-28 0,64-128 0,-34 57 0,-19 31 0,-3-2 0,-5-2 0,35-132 0,-63 190 0,-3 0 0,0-1 0,1-55 0,-9-112 0,-1 98 0,0 23 0,-3 0 0,-22-110 0,21 168 0,-1 0 0,-1 1 0,-1-1 0,-1 2 0,-1-1 0,-1 2 0,-1-1 0,-1 2 0,-27-34 0,21 38 0,0 0 0,0 1 0,-2 1 0,-27-14 0,-39-28 0,34 17 0,-2 3 0,-1 3 0,-2 2 0,-1 2 0,-1 4 0,-2 1 0,-75-17 0,-357-68 0,450 100 0,0-2 0,1-1 0,-53-25 0,41 20-125,0 2-1,-1 2 1,-98-10-1,105 17-737,-2-1-5963</inkml:trace>
 </inkml:ink>
 </file>
 
@@ -682,7 +708,7 @@
           <a:p>
             <a:fld id="{73386005-8F80-1A49-87D1-22EBFA47E352}" type="datetimeFigureOut">
               <a:rPr lang="en-US" smtClean="0"/>
-              <a:t>12/13/24</a:t>
+              <a:t>3/3/2025</a:t>
             </a:fld>
             <a:endParaRPr lang="en-US"/>
           </a:p>
@@ -1367,165 +1393,6 @@
 </p:notes>
 </file>
 
-<file path=ppt/notesSlides/notesSlide5.xml><?xml version="1.0" encoding="utf-8"?>
-<p:notes xmlns:a="http://schemas.openxmlformats.org/drawingml/2006/main" xmlns:r="http://schemas.openxmlformats.org/officeDocument/2006/relationships" xmlns:p="http://schemas.openxmlformats.org/presentationml/2006/main">
-  <p:cSld>
-    <p:spTree>
-      <p:nvGrpSpPr>
-        <p:cNvPr id="1" name=""/>
-        <p:cNvGrpSpPr/>
-        <p:nvPr/>
-      </p:nvGrpSpPr>
-      <p:grpSpPr>
-        <a:xfrm>
-          <a:off x="0" y="0"/>
-          <a:ext cx="0" cy="0"/>
-          <a:chOff x="0" y="0"/>
-          <a:chExt cx="0" cy="0"/>
-        </a:xfrm>
-      </p:grpSpPr>
-      <p:sp>
-        <p:nvSpPr>
-          <p:cNvPr id="2" name="Slide Image Placeholder 1"/>
-          <p:cNvSpPr>
-            <a:spLocks noGrp="1" noRot="1" noChangeAspect="1"/>
-          </p:cNvSpPr>
-          <p:nvPr>
-            <p:ph type="sldImg"/>
-          </p:nvPr>
-        </p:nvSpPr>
-        <p:spPr/>
-      </p:sp>
-      <p:sp>
-        <p:nvSpPr>
-          <p:cNvPr id="3" name="Notes Placeholder 2"/>
-          <p:cNvSpPr>
-            <a:spLocks noGrp="1"/>
-          </p:cNvSpPr>
-          <p:nvPr>
-            <p:ph type="body" idx="1"/>
-          </p:nvPr>
-        </p:nvSpPr>
-        <p:spPr/>
-        <p:txBody>
-          <a:bodyPr/>
-          <a:lstStyle/>
-          <a:p>
-            <a:r>
-              <a:rPr lang="en-US" dirty="0"/>
-              <a:t>Do</a:t>
-            </a:r>
-            <a:r>
-              <a:rPr lang="en-US" baseline="0" dirty="0"/>
-              <a:t> not spend too much time on this since students will need time outside of class to complete this.  Be sure to reserve time for the rest of the material and for students to complete the quiz.</a:t>
-            </a:r>
-            <a:endParaRPr lang="en-US" dirty="0"/>
-          </a:p>
-        </p:txBody>
-      </p:sp>
-      <p:sp>
-        <p:nvSpPr>
-          <p:cNvPr id="4" name="Slide Number Placeholder 3"/>
-          <p:cNvSpPr>
-            <a:spLocks noGrp="1"/>
-          </p:cNvSpPr>
-          <p:nvPr>
-            <p:ph type="sldNum" sz="quarter" idx="10"/>
-          </p:nvPr>
-        </p:nvSpPr>
-        <p:spPr/>
-        <p:txBody>
-          <a:bodyPr/>
-          <a:lstStyle/>
-          <a:p>
-            <a:pPr>
-              <a:defRPr/>
-            </a:pPr>
-            <a:fld id="{F3BF035C-C190-4FBE-9474-8535FCFBFED8}" type="slidenum">
-              <a:rPr lang="en-US" smtClean="0"/>
-              <a:pPr>
-                <a:defRPr/>
-              </a:pPr>
-              <a:t>11</a:t>
-            </a:fld>
-            <a:endParaRPr lang="en-US"/>
-          </a:p>
-        </p:txBody>
-      </p:sp>
-    </p:spTree>
-    <p:extLst>
-      <p:ext uri="{BB962C8B-B14F-4D97-AF65-F5344CB8AC3E}">
-        <p14:creationId xmlns:p14="http://schemas.microsoft.com/office/powerpoint/2010/main" val="1834661279"/>
-      </p:ext>
-    </p:extLst>
-  </p:cSld>
-  <p:clrMapOvr>
-    <a:masterClrMapping/>
-  </p:clrMapOvr>
-</p:notes>
-</file>
-
-<file path=ppt/notesSlides/notesSlide6.xml><?xml version="1.0" encoding="utf-8"?>
-<p:notes xmlns:a="http://schemas.openxmlformats.org/drawingml/2006/main" xmlns:r="http://schemas.openxmlformats.org/officeDocument/2006/relationships" xmlns:p="http://schemas.openxmlformats.org/presentationml/2006/main">
-  <p:cSld>
-    <p:spTree>
-      <p:nvGrpSpPr>
-        <p:cNvPr id="1" name=""/>
-        <p:cNvGrpSpPr/>
-        <p:nvPr/>
-      </p:nvGrpSpPr>
-      <p:grpSpPr>
-        <a:xfrm>
-          <a:off x="0" y="0"/>
-          <a:ext cx="0" cy="0"/>
-          <a:chOff x="0" y="0"/>
-          <a:chExt cx="0" cy="0"/>
-        </a:xfrm>
-      </p:grpSpPr>
-      <p:sp>
-        <p:nvSpPr>
-          <p:cNvPr id="2" name="Slide Image Placeholder 1"/>
-          <p:cNvSpPr>
-            <a:spLocks noGrp="1" noRot="1" noChangeAspect="1"/>
-          </p:cNvSpPr>
-          <p:nvPr>
-            <p:ph type="sldImg"/>
-          </p:nvPr>
-        </p:nvSpPr>
-        <p:spPr/>
-      </p:sp>
-      <p:sp>
-        <p:nvSpPr>
-          <p:cNvPr id="3" name="Notes Placeholder 2"/>
-          <p:cNvSpPr>
-            <a:spLocks noGrp="1"/>
-          </p:cNvSpPr>
-          <p:nvPr>
-            <p:ph type="body" idx="1"/>
-          </p:nvPr>
-        </p:nvSpPr>
-        <p:spPr/>
-        <p:txBody>
-          <a:bodyPr/>
-          <a:lstStyle/>
-          <a:p>
-            <a:endParaRPr lang="en-US" dirty="0"/>
-          </a:p>
-        </p:txBody>
-      </p:sp>
-    </p:spTree>
-    <p:extLst>
-      <p:ext uri="{BB962C8B-B14F-4D97-AF65-F5344CB8AC3E}">
-        <p14:creationId xmlns:p14="http://schemas.microsoft.com/office/powerpoint/2010/main" val="1739724047"/>
-      </p:ext>
-    </p:extLst>
-  </p:cSld>
-  <p:clrMapOvr>
-    <a:masterClrMapping/>
-  </p:clrMapOvr>
-</p:notes>
-</file>
-
 <file path=ppt/slideLayouts/slideLayout1.xml><?xml version="1.0" encoding="utf-8"?>
 <p:sldLayout xmlns:a="http://schemas.openxmlformats.org/drawingml/2006/main" xmlns:r="http://schemas.openxmlformats.org/officeDocument/2006/relationships" xmlns:p="http://schemas.openxmlformats.org/presentationml/2006/main" type="title" preserve="1">
   <p:cSld name="Title Slide">
@@ -1705,7 +1572,7 @@
           <a:p>
             <a:fld id="{5B07E745-2C70-2943-8487-A8F6E88ADF5E}" type="datetimeFigureOut">
               <a:rPr lang="en-US" smtClean="0"/>
-              <a:t>12/13/24</a:t>
+              <a:t>3/3/2025</a:t>
             </a:fld>
             <a:endParaRPr lang="en-US"/>
           </a:p>
@@ -1873,7 +1740,7 @@
           <a:p>
             <a:fld id="{5B07E745-2C70-2943-8487-A8F6E88ADF5E}" type="datetimeFigureOut">
               <a:rPr lang="en-US" smtClean="0"/>
-              <a:t>12/13/24</a:t>
+              <a:t>3/3/2025</a:t>
             </a:fld>
             <a:endParaRPr lang="en-US"/>
           </a:p>
@@ -2051,7 +1918,7 @@
           <a:p>
             <a:fld id="{5B07E745-2C70-2943-8487-A8F6E88ADF5E}" type="datetimeFigureOut">
               <a:rPr lang="en-US" smtClean="0"/>
-              <a:t>12/13/24</a:t>
+              <a:t>3/3/2025</a:t>
             </a:fld>
             <a:endParaRPr lang="en-US"/>
           </a:p>
@@ -2219,7 +2086,7 @@
           <a:p>
             <a:fld id="{5B07E745-2C70-2943-8487-A8F6E88ADF5E}" type="datetimeFigureOut">
               <a:rPr lang="en-US" smtClean="0"/>
-              <a:t>12/13/24</a:t>
+              <a:t>3/3/2025</a:t>
             </a:fld>
             <a:endParaRPr lang="en-US"/>
           </a:p>
@@ -2464,7 +2331,7 @@
           <a:p>
             <a:fld id="{5B07E745-2C70-2943-8487-A8F6E88ADF5E}" type="datetimeFigureOut">
               <a:rPr lang="en-US" smtClean="0"/>
-              <a:t>12/13/24</a:t>
+              <a:t>3/3/2025</a:t>
             </a:fld>
             <a:endParaRPr lang="en-US"/>
           </a:p>
@@ -2749,7 +2616,7 @@
           <a:p>
             <a:fld id="{5B07E745-2C70-2943-8487-A8F6E88ADF5E}" type="datetimeFigureOut">
               <a:rPr lang="en-US" smtClean="0"/>
-              <a:t>12/13/24</a:t>
+              <a:t>3/3/2025</a:t>
             </a:fld>
             <a:endParaRPr lang="en-US"/>
           </a:p>
@@ -3168,7 +3035,7 @@
           <a:p>
             <a:fld id="{5B07E745-2C70-2943-8487-A8F6E88ADF5E}" type="datetimeFigureOut">
               <a:rPr lang="en-US" smtClean="0"/>
-              <a:t>12/13/24</a:t>
+              <a:t>3/3/2025</a:t>
             </a:fld>
             <a:endParaRPr lang="en-US"/>
           </a:p>
@@ -3285,7 +3152,7 @@
           <a:p>
             <a:fld id="{5B07E745-2C70-2943-8487-A8F6E88ADF5E}" type="datetimeFigureOut">
               <a:rPr lang="en-US" smtClean="0"/>
-              <a:t>12/13/24</a:t>
+              <a:t>3/3/2025</a:t>
             </a:fld>
             <a:endParaRPr lang="en-US"/>
           </a:p>
@@ -3380,7 +3247,7 @@
           <a:p>
             <a:fld id="{5B07E745-2C70-2943-8487-A8F6E88ADF5E}" type="datetimeFigureOut">
               <a:rPr lang="en-US" smtClean="0"/>
-              <a:t>12/13/24</a:t>
+              <a:t>3/3/2025</a:t>
             </a:fld>
             <a:endParaRPr lang="en-US"/>
           </a:p>
@@ -3655,7 +3522,7 @@
           <a:p>
             <a:fld id="{5B07E745-2C70-2943-8487-A8F6E88ADF5E}" type="datetimeFigureOut">
               <a:rPr lang="en-US" smtClean="0"/>
-              <a:t>12/13/24</a:t>
+              <a:t>3/3/2025</a:t>
             </a:fld>
             <a:endParaRPr lang="en-US"/>
           </a:p>
@@ -3907,7 +3774,7 @@
           <a:p>
             <a:fld id="{5B07E745-2C70-2943-8487-A8F6E88ADF5E}" type="datetimeFigureOut">
               <a:rPr lang="en-US" smtClean="0"/>
-              <a:t>12/13/24</a:t>
+              <a:t>3/3/2025</a:t>
             </a:fld>
             <a:endParaRPr lang="en-US"/>
           </a:p>
@@ -4118,7 +3985,7 @@
           <a:p>
             <a:fld id="{5B07E745-2C70-2943-8487-A8F6E88ADF5E}" type="datetimeFigureOut">
               <a:rPr lang="en-US" smtClean="0"/>
-              <a:t>12/13/24</a:t>
+              <a:t>3/3/2025</a:t>
             </a:fld>
             <a:endParaRPr lang="en-US"/>
           </a:p>
@@ -4757,10 +4624,10 @@
       </p:sp>
       <p:pic>
         <p:nvPicPr>
-          <p:cNvPr id="5" name="Picture 4">
+          <p:cNvPr id="6" name="Picture 5">
             <a:extLst>
               <a:ext uri="{FF2B5EF4-FFF2-40B4-BE49-F238E27FC236}">
-                <a16:creationId xmlns:a16="http://schemas.microsoft.com/office/drawing/2014/main" id="{DB96B622-E925-552A-2A71-E1AFC233063D}"/>
+                <a16:creationId xmlns:a16="http://schemas.microsoft.com/office/drawing/2014/main" id="{18EC4BAF-94C5-C60C-68BF-E017A124A5A6}"/>
               </a:ext>
             </a:extLst>
           </p:cNvPr>
@@ -4777,642 +4644,22 @@
         </p:blipFill>
         <p:spPr>
           <a:xfrm>
-            <a:off x="3256318" y="2116899"/>
-            <a:ext cx="4709508" cy="2680569"/>
+            <a:off x="3602927" y="2287189"/>
+            <a:ext cx="3505689" cy="2457793"/>
           </a:xfrm>
           <a:prstGeom prst="rect">
             <a:avLst/>
           </a:prstGeom>
         </p:spPr>
       </p:pic>
-    </p:spTree>
-    <p:extLst>
-      <p:ext uri="{BB962C8B-B14F-4D97-AF65-F5344CB8AC3E}">
-        <p14:creationId xmlns:p14="http://schemas.microsoft.com/office/powerpoint/2010/main" val="2875033241"/>
-      </p:ext>
-    </p:extLst>
-  </p:cSld>
-  <p:clrMapOvr>
-    <a:masterClrMapping/>
-  </p:clrMapOvr>
-</p:sld>
-</file>
-
-<file path=ppt/slides/slide11.xml><?xml version="1.0" encoding="utf-8"?>
-<p:sld xmlns:a="http://schemas.openxmlformats.org/drawingml/2006/main" xmlns:r="http://schemas.openxmlformats.org/officeDocument/2006/relationships" xmlns:p="http://schemas.openxmlformats.org/presentationml/2006/main">
-  <p:cSld>
-    <p:spTree>
-      <p:nvGrpSpPr>
-        <p:cNvPr id="1" name=""/>
-        <p:cNvGrpSpPr/>
-        <p:nvPr/>
-      </p:nvGrpSpPr>
-      <p:grpSpPr>
-        <a:xfrm>
-          <a:off x="0" y="0"/>
-          <a:ext cx="0" cy="0"/>
-          <a:chOff x="0" y="0"/>
-          <a:chExt cx="0" cy="0"/>
-        </a:xfrm>
-      </p:grpSpPr>
-      <p:sp>
-        <p:nvSpPr>
-          <p:cNvPr id="2" name="Title 1"/>
-          <p:cNvSpPr>
-            <a:spLocks noGrp="1"/>
-          </p:cNvSpPr>
-          <p:nvPr>
-            <p:ph type="title"/>
-          </p:nvPr>
-        </p:nvSpPr>
-        <p:spPr>
-          <a:xfrm>
-            <a:off x="356992" y="363255"/>
-            <a:ext cx="4653419" cy="1830996"/>
-          </a:xfrm>
-        </p:spPr>
-        <p:txBody>
-          <a:bodyPr>
-            <a:normAutofit fontScale="90000"/>
-          </a:bodyPr>
-          <a:lstStyle/>
-          <a:p>
-            <a:r>
-              <a:rPr lang="en-US" dirty="0"/>
-              <a:t>Now code the </a:t>
-            </a:r>
-            <a:r>
-              <a:rPr lang="en-US" dirty="0" err="1"/>
-              <a:t>StudentGradebook</a:t>
-            </a:r>
-            <a:r>
-              <a:rPr lang="en-US" dirty="0"/>
-              <a:t> class yourself</a:t>
-            </a:r>
-          </a:p>
-        </p:txBody>
-      </p:sp>
-      <p:sp>
-        <p:nvSpPr>
-          <p:cNvPr id="3" name="Content Placeholder 2"/>
-          <p:cNvSpPr>
-            <a:spLocks noGrp="1"/>
-          </p:cNvSpPr>
-          <p:nvPr>
-            <p:ph idx="1"/>
-          </p:nvPr>
-        </p:nvSpPr>
-        <p:spPr>
-          <a:xfrm>
-            <a:off x="344466" y="3391423"/>
-            <a:ext cx="8649222" cy="3209794"/>
-          </a:xfrm>
-        </p:spPr>
-        <p:txBody>
-          <a:bodyPr>
-            <a:normAutofit fontScale="92500" lnSpcReduction="10000"/>
-          </a:bodyPr>
-          <a:lstStyle/>
-          <a:p>
-            <a:r>
-              <a:rPr lang="en-US" dirty="0"/>
-              <a:t>Uncomment the code found in </a:t>
-            </a:r>
-            <a:r>
-              <a:rPr lang="en-US" dirty="0" err="1"/>
-              <a:t>StudentGradebookMain</a:t>
-            </a:r>
-            <a:r>
-              <a:rPr lang="en-US" dirty="0"/>
-              <a:t> to see what the class should do</a:t>
-            </a:r>
-          </a:p>
-          <a:p>
-            <a:r>
-              <a:rPr lang="en-US" dirty="0"/>
-              <a:t>Then create the class and add the constructors and methods you need</a:t>
-            </a:r>
-          </a:p>
-          <a:p>
-            <a:r>
-              <a:rPr lang="en-US" dirty="0"/>
-              <a:t>If you finish early, add a function to compute the student’s average grade</a:t>
-            </a:r>
-          </a:p>
-        </p:txBody>
-      </p:sp>
-      <p:pic>
-        <p:nvPicPr>
-          <p:cNvPr id="4" name="Picture 3">
-            <a:extLst>
-              <a:ext uri="{FF2B5EF4-FFF2-40B4-BE49-F238E27FC236}">
-                <a16:creationId xmlns:a16="http://schemas.microsoft.com/office/drawing/2014/main" id="{67A5314D-6141-0718-7DF0-030AD8118296}"/>
-              </a:ext>
-            </a:extLst>
-          </p:cNvPr>
-          <p:cNvPicPr>
-            <a:picLocks noChangeAspect="1"/>
-          </p:cNvPicPr>
-          <p:nvPr/>
-        </p:nvPicPr>
-        <p:blipFill>
-          <a:blip r:embed="rId3"/>
-          <a:stretch>
-            <a:fillRect/>
-          </a:stretch>
-        </p:blipFill>
-        <p:spPr>
-          <a:xfrm>
-            <a:off x="4862534" y="76723"/>
-            <a:ext cx="3937000" cy="3314700"/>
-          </a:xfrm>
-          <a:prstGeom prst="rect">
-            <a:avLst/>
-          </a:prstGeom>
-        </p:spPr>
-      </p:pic>
-    </p:spTree>
-    <p:extLst>
-      <p:ext uri="{BB962C8B-B14F-4D97-AF65-F5344CB8AC3E}">
-        <p14:creationId xmlns:p14="http://schemas.microsoft.com/office/powerpoint/2010/main" val="3549654333"/>
-      </p:ext>
-    </p:extLst>
-  </p:cSld>
-  <p:clrMapOvr>
-    <a:masterClrMapping/>
-  </p:clrMapOvr>
-</p:sld>
-</file>
-
-<file path=ppt/slides/slide12.xml><?xml version="1.0" encoding="utf-8"?>
-<p:sld xmlns:a="http://schemas.openxmlformats.org/drawingml/2006/main" xmlns:r="http://schemas.openxmlformats.org/officeDocument/2006/relationships" xmlns:p="http://schemas.openxmlformats.org/presentationml/2006/main">
-  <p:cSld>
-    <p:spTree>
-      <p:nvGrpSpPr>
-        <p:cNvPr id="1" name=""/>
-        <p:cNvGrpSpPr/>
-        <p:nvPr/>
-      </p:nvGrpSpPr>
-      <p:grpSpPr>
-        <a:xfrm>
-          <a:off x="0" y="0"/>
-          <a:ext cx="0" cy="0"/>
-          <a:chOff x="0" y="0"/>
-          <a:chExt cx="0" cy="0"/>
-        </a:xfrm>
-      </p:grpSpPr>
-      <p:sp>
-        <p:nvSpPr>
-          <p:cNvPr id="2" name="Title 1"/>
-          <p:cNvSpPr>
-            <a:spLocks noGrp="1"/>
-          </p:cNvSpPr>
-          <p:nvPr>
-            <p:ph type="title"/>
-          </p:nvPr>
-        </p:nvSpPr>
-        <p:spPr>
-          <a:xfrm>
-            <a:off x="457200" y="92077"/>
-            <a:ext cx="8229600" cy="1023492"/>
-          </a:xfrm>
-        </p:spPr>
-        <p:txBody>
-          <a:bodyPr>
-            <a:normAutofit/>
-          </a:bodyPr>
-          <a:lstStyle/>
-          <a:p>
-            <a:r>
-              <a:rPr lang="en-US" dirty="0">
-                <a:latin typeface="Arial" panose="020B0604020202020204" pitchFamily="34" charset="0"/>
-                <a:cs typeface="Arial" panose="020B0604020202020204" pitchFamily="34" charset="0"/>
-              </a:rPr>
-              <a:t>Terminology Review</a:t>
-            </a:r>
-          </a:p>
-        </p:txBody>
-      </p:sp>
-      <p:sp>
-        <p:nvSpPr>
-          <p:cNvPr id="11" name="Slide Number Placeholder 10">
-            <a:extLst>
-              <a:ext uri="{FF2B5EF4-FFF2-40B4-BE49-F238E27FC236}">
-                <a16:creationId xmlns:a16="http://schemas.microsoft.com/office/drawing/2014/main" id="{D5DE743B-EE8E-314A-864F-CCBBB7B62BB2}"/>
-              </a:ext>
-            </a:extLst>
-          </p:cNvPr>
-          <p:cNvSpPr>
-            <a:spLocks noGrp="1"/>
-          </p:cNvSpPr>
-          <p:nvPr>
-            <p:ph type="sldNum" sz="quarter" idx="2"/>
-          </p:nvPr>
-        </p:nvSpPr>
-        <p:spPr>
-          <a:xfrm>
-            <a:off x="6553200" y="6406785"/>
-            <a:ext cx="2133600" cy="264255"/>
-          </a:xfrm>
-          <a:prstGeom prst="rect">
-            <a:avLst/>
-          </a:prstGeom>
-          <a:ln w="12700">
-            <a:miter lim="400000"/>
-          </a:ln>
-        </p:spPr>
-        <p:txBody>
-          <a:bodyPr lIns="45719" rIns="45719" anchor="ctr">
-            <a:spAutoFit/>
-          </a:bodyPr>
-          <a:lstStyle>
-            <a:lvl1pPr algn="r">
-              <a:defRPr sz="1200">
-                <a:solidFill>
-                  <a:srgbClr val="888888"/>
-                </a:solidFill>
-                <a:latin typeface="Arial"/>
-                <a:ea typeface="Arial"/>
-                <a:cs typeface="Arial"/>
-                <a:sym typeface="Arial"/>
-              </a:defRPr>
-            </a:lvl1pPr>
-            <a:lvl2pPr indent="457200">
-              <a:defRPr>
-                <a:latin typeface="Calibri"/>
-                <a:ea typeface="Calibri"/>
-                <a:cs typeface="Calibri"/>
-                <a:sym typeface="Calibri"/>
-              </a:defRPr>
-            </a:lvl2pPr>
-            <a:lvl3pPr indent="914400">
-              <a:defRPr>
-                <a:latin typeface="Calibri"/>
-                <a:ea typeface="Calibri"/>
-                <a:cs typeface="Calibri"/>
-                <a:sym typeface="Calibri"/>
-              </a:defRPr>
-            </a:lvl3pPr>
-            <a:lvl4pPr indent="1371600">
-              <a:defRPr>
-                <a:latin typeface="Calibri"/>
-                <a:ea typeface="Calibri"/>
-                <a:cs typeface="Calibri"/>
-                <a:sym typeface="Calibri"/>
-              </a:defRPr>
-            </a:lvl4pPr>
-            <a:lvl5pPr indent="1828800">
-              <a:defRPr>
-                <a:latin typeface="Calibri"/>
-                <a:ea typeface="Calibri"/>
-                <a:cs typeface="Calibri"/>
-                <a:sym typeface="Calibri"/>
-              </a:defRPr>
-            </a:lvl5pPr>
-            <a:lvl6pPr indent="2286000">
-              <a:defRPr>
-                <a:latin typeface="Calibri"/>
-                <a:ea typeface="Calibri"/>
-                <a:cs typeface="Calibri"/>
-                <a:sym typeface="Calibri"/>
-              </a:defRPr>
-            </a:lvl6pPr>
-            <a:lvl7pPr indent="2743200">
-              <a:defRPr>
-                <a:latin typeface="Calibri"/>
-                <a:ea typeface="Calibri"/>
-                <a:cs typeface="Calibri"/>
-                <a:sym typeface="Calibri"/>
-              </a:defRPr>
-            </a:lvl7pPr>
-            <a:lvl8pPr indent="3200400">
-              <a:defRPr>
-                <a:latin typeface="Calibri"/>
-                <a:ea typeface="Calibri"/>
-                <a:cs typeface="Calibri"/>
-                <a:sym typeface="Calibri"/>
-              </a:defRPr>
-            </a:lvl8pPr>
-            <a:lvl9pPr indent="3657600">
-              <a:defRPr>
-                <a:latin typeface="Calibri"/>
-                <a:ea typeface="Calibri"/>
-                <a:cs typeface="Calibri"/>
-                <a:sym typeface="Calibri"/>
-              </a:defRPr>
-            </a:lvl9pPr>
-          </a:lstStyle>
-          <a:p>
-            <a:pPr lvl="0"/>
-            <a:fld id="{86CB4B4D-7CA3-9044-876B-883B54F8677D}" type="slidenum">
-              <a:rPr lang="en-US" smtClean="0"/>
-              <a:pPr lvl="0"/>
-              <a:t>12</a:t>
-            </a:fld>
-            <a:endParaRPr lang="en-US"/>
-          </a:p>
-        </p:txBody>
-      </p:sp>
-      <p:sp>
-        <p:nvSpPr>
-          <p:cNvPr id="13" name="TextBox 12">
-            <a:extLst>
-              <a:ext uri="{FF2B5EF4-FFF2-40B4-BE49-F238E27FC236}">
-                <a16:creationId xmlns:a16="http://schemas.microsoft.com/office/drawing/2014/main" id="{1A5A6E4F-24C4-6843-A618-4DE7697FCC83}"/>
-              </a:ext>
-            </a:extLst>
-          </p:cNvPr>
-          <p:cNvSpPr txBox="1"/>
-          <p:nvPr/>
-        </p:nvSpPr>
-        <p:spPr>
-          <a:xfrm>
-            <a:off x="309468" y="1386348"/>
-            <a:ext cx="8525064" cy="4478992"/>
-          </a:xfrm>
-          <a:prstGeom prst="rect">
-            <a:avLst/>
-          </a:prstGeom>
-          <a:noFill/>
-        </p:spPr>
-        <p:txBody>
-          <a:bodyPr wrap="square" rtlCol="0">
-            <a:normAutofit/>
-          </a:bodyPr>
-          <a:lstStyle/>
-          <a:p>
-            <a:pPr marL="342900" indent="-342900">
-              <a:spcAft>
-                <a:spcPts val="400"/>
-              </a:spcAft>
-              <a:buFont typeface="Arial" panose="020B0604020202020204" pitchFamily="34" charset="0"/>
-              <a:buChar char="•"/>
-            </a:pPr>
-            <a:r>
-              <a:rPr lang="en-US" i="1" dirty="0">
-                <a:highlight>
-                  <a:srgbClr val="FFFF00"/>
-                </a:highlight>
-                <a:latin typeface="Times New Roman" panose="02020603050405020304" pitchFamily="18" charset="0"/>
-                <a:cs typeface="Times New Roman" panose="02020603050405020304" pitchFamily="18" charset="0"/>
-              </a:rPr>
-              <a:t>client</a:t>
-            </a:r>
-            <a:r>
-              <a:rPr lang="en-US" dirty="0">
-                <a:latin typeface="Times New Roman" panose="02020603050405020304" pitchFamily="18" charset="0"/>
-                <a:cs typeface="Times New Roman" panose="02020603050405020304" pitchFamily="18" charset="0"/>
-              </a:rPr>
-              <a:t> –  uses the services of a primitive type or class by declaring variables from these types and then calling operations to manipulate these variables</a:t>
-            </a:r>
-          </a:p>
-          <a:p>
-            <a:pPr marL="342900" indent="-342900">
-              <a:spcAft>
-                <a:spcPts val="400"/>
-              </a:spcAft>
-              <a:buFont typeface="Arial" panose="020B0604020202020204" pitchFamily="34" charset="0"/>
-              <a:buChar char="•"/>
-            </a:pPr>
-            <a:r>
-              <a:rPr lang="en-US" i="1" dirty="0">
-                <a:latin typeface="Times New Roman" panose="02020603050405020304" pitchFamily="18" charset="0"/>
-                <a:cs typeface="Times New Roman" panose="02020603050405020304" pitchFamily="18" charset="0"/>
-              </a:rPr>
-              <a:t>object</a:t>
-            </a:r>
-            <a:r>
-              <a:rPr lang="en-US" dirty="0">
-                <a:latin typeface="Times New Roman" panose="02020603050405020304" pitchFamily="18" charset="0"/>
-                <a:cs typeface="Times New Roman" panose="02020603050405020304" pitchFamily="18" charset="0"/>
-              </a:rPr>
-              <a:t> – a variable that stores a reference to an object instance</a:t>
-            </a:r>
-          </a:p>
-          <a:p>
-            <a:pPr marL="342900" indent="-342900">
-              <a:spcAft>
-                <a:spcPts val="400"/>
-              </a:spcAft>
-              <a:buFont typeface="Arial" panose="020B0604020202020204" pitchFamily="34" charset="0"/>
-              <a:buChar char="•"/>
-            </a:pPr>
-            <a:r>
-              <a:rPr lang="en-US" dirty="0">
-                <a:latin typeface="Times New Roman" panose="02020603050405020304" pitchFamily="18" charset="0"/>
-                <a:cs typeface="Times New Roman" panose="02020603050405020304" pitchFamily="18" charset="0"/>
-              </a:rPr>
-              <a:t>primitive type – </a:t>
-            </a:r>
-            <a:r>
-              <a:rPr lang="en-US" sz="1600" dirty="0" err="1">
-                <a:latin typeface="Courier New" panose="02070309020205020404" pitchFamily="49" charset="0"/>
-                <a:cs typeface="Courier New" panose="02070309020205020404" pitchFamily="49" charset="0"/>
-              </a:rPr>
-              <a:t>boolean</a:t>
-            </a:r>
-            <a:r>
-              <a:rPr lang="en-US" dirty="0">
-                <a:latin typeface="Times New Roman" panose="02020603050405020304" pitchFamily="18" charset="0"/>
-                <a:cs typeface="Times New Roman" panose="02020603050405020304" pitchFamily="18" charset="0"/>
-              </a:rPr>
-              <a:t>, </a:t>
-            </a:r>
-            <a:r>
-              <a:rPr lang="en-US" sz="1600" dirty="0">
-                <a:latin typeface="Courier New" panose="02070309020205020404" pitchFamily="49" charset="0"/>
-                <a:cs typeface="Courier New" panose="02070309020205020404" pitchFamily="49" charset="0"/>
-              </a:rPr>
-              <a:t>byte</a:t>
-            </a:r>
-            <a:r>
-              <a:rPr lang="en-US" dirty="0">
-                <a:latin typeface="Times New Roman" panose="02020603050405020304" pitchFamily="18" charset="0"/>
-                <a:cs typeface="Times New Roman" panose="02020603050405020304" pitchFamily="18" charset="0"/>
-              </a:rPr>
-              <a:t>, </a:t>
-            </a:r>
-            <a:r>
-              <a:rPr lang="en-US" sz="1600" dirty="0">
-                <a:latin typeface="Courier New" panose="02070309020205020404" pitchFamily="49" charset="0"/>
-                <a:cs typeface="Courier New" panose="02070309020205020404" pitchFamily="49" charset="0"/>
-              </a:rPr>
-              <a:t>character</a:t>
-            </a:r>
-            <a:r>
-              <a:rPr lang="en-US" dirty="0">
-                <a:latin typeface="Times New Roman" panose="02020603050405020304" pitchFamily="18" charset="0"/>
-                <a:cs typeface="Times New Roman" panose="02020603050405020304" pitchFamily="18" charset="0"/>
-              </a:rPr>
-              <a:t>, </a:t>
-            </a:r>
-            <a:r>
-              <a:rPr lang="en-US" sz="1600" dirty="0">
-                <a:latin typeface="Courier New" panose="02070309020205020404" pitchFamily="49" charset="0"/>
-                <a:cs typeface="Courier New" panose="02070309020205020404" pitchFamily="49" charset="0"/>
-              </a:rPr>
-              <a:t>short</a:t>
-            </a:r>
-            <a:r>
-              <a:rPr lang="en-US" dirty="0">
-                <a:latin typeface="Times New Roman" panose="02020603050405020304" pitchFamily="18" charset="0"/>
-                <a:cs typeface="Times New Roman" panose="02020603050405020304" pitchFamily="18" charset="0"/>
-              </a:rPr>
-              <a:t>, </a:t>
-            </a:r>
-            <a:r>
-              <a:rPr lang="en-US" sz="1600" dirty="0">
-                <a:latin typeface="Courier New" panose="02070309020205020404" pitchFamily="49" charset="0"/>
-                <a:cs typeface="Courier New" panose="02070309020205020404" pitchFamily="49" charset="0"/>
-              </a:rPr>
-              <a:t>int</a:t>
-            </a:r>
-            <a:r>
-              <a:rPr lang="en-US" dirty="0">
-                <a:latin typeface="Times New Roman" panose="02020603050405020304" pitchFamily="18" charset="0"/>
-                <a:cs typeface="Times New Roman" panose="02020603050405020304" pitchFamily="18" charset="0"/>
-              </a:rPr>
-              <a:t>, </a:t>
-            </a:r>
-            <a:r>
-              <a:rPr lang="en-US" sz="1600" dirty="0">
-                <a:latin typeface="Courier New" panose="02070309020205020404" pitchFamily="49" charset="0"/>
-                <a:cs typeface="Courier New" panose="02070309020205020404" pitchFamily="49" charset="0"/>
-              </a:rPr>
-              <a:t>float</a:t>
-            </a:r>
-            <a:r>
-              <a:rPr lang="en-US" dirty="0">
-                <a:latin typeface="Times New Roman" panose="02020603050405020304" pitchFamily="18" charset="0"/>
-                <a:cs typeface="Times New Roman" panose="02020603050405020304" pitchFamily="18" charset="0"/>
-              </a:rPr>
-              <a:t>, </a:t>
-            </a:r>
-            <a:r>
-              <a:rPr lang="en-US" sz="1600" dirty="0">
-                <a:latin typeface="Courier New" panose="02070309020205020404" pitchFamily="49" charset="0"/>
-                <a:cs typeface="Courier New" panose="02070309020205020404" pitchFamily="49" charset="0"/>
-              </a:rPr>
-              <a:t>double</a:t>
-            </a:r>
-            <a:br>
-              <a:rPr lang="en-US" sz="1600" dirty="0">
-                <a:latin typeface="Times New Roman" panose="02020603050405020304" pitchFamily="18" charset="0"/>
-                <a:cs typeface="Times New Roman" panose="02020603050405020304" pitchFamily="18" charset="0"/>
-              </a:rPr>
-            </a:br>
-            <a:r>
-              <a:rPr lang="en-US" dirty="0">
-                <a:latin typeface="Times New Roman" panose="02020603050405020304" pitchFamily="18" charset="0"/>
-                <a:cs typeface="Times New Roman" panose="02020603050405020304" pitchFamily="18" charset="0"/>
-              </a:rPr>
-              <a:t>variables of these these types are not objects in Java</a:t>
-            </a:r>
-          </a:p>
-          <a:p>
-            <a:pPr marL="342900" indent="-342900">
-              <a:spcAft>
-                <a:spcPts val="400"/>
-              </a:spcAft>
-              <a:buFont typeface="Arial" panose="020B0604020202020204" pitchFamily="34" charset="0"/>
-              <a:buChar char="•"/>
-            </a:pPr>
-            <a:r>
-              <a:rPr lang="en-US" i="1" dirty="0">
-                <a:latin typeface="Times New Roman" panose="02020603050405020304" pitchFamily="18" charset="0"/>
-                <a:cs typeface="Times New Roman" panose="02020603050405020304" pitchFamily="18" charset="0"/>
-              </a:rPr>
-              <a:t>variable</a:t>
-            </a:r>
-            <a:r>
-              <a:rPr lang="en-US" dirty="0">
-                <a:latin typeface="Times New Roman" panose="02020603050405020304" pitchFamily="18" charset="0"/>
-                <a:cs typeface="Times New Roman" panose="02020603050405020304" pitchFamily="18" charset="0"/>
-              </a:rPr>
-              <a:t> – stores either primitive data (e.g., from type </a:t>
-            </a:r>
-            <a:r>
-              <a:rPr lang="en-US" sz="1600" dirty="0">
-                <a:latin typeface="Courier New" panose="02070309020205020404" pitchFamily="49" charset="0"/>
-                <a:cs typeface="Courier New" panose="02070309020205020404" pitchFamily="49" charset="0"/>
-              </a:rPr>
-              <a:t>int</a:t>
-            </a:r>
-            <a:r>
-              <a:rPr lang="en-US" dirty="0">
-                <a:latin typeface="Times New Roman" panose="02020603050405020304" pitchFamily="18" charset="0"/>
-                <a:cs typeface="Times New Roman" panose="02020603050405020304" pitchFamily="18" charset="0"/>
-              </a:rPr>
-              <a:t>) or reference data (i.e., a reference to an object instance)</a:t>
-            </a:r>
-          </a:p>
-          <a:p>
-            <a:pPr marL="342900" indent="-342900">
-              <a:spcAft>
-                <a:spcPts val="400"/>
-              </a:spcAft>
-              <a:buFont typeface="Arial" panose="020B0604020202020204" pitchFamily="34" charset="0"/>
-              <a:buChar char="•"/>
-            </a:pPr>
-            <a:r>
-              <a:rPr lang="en-US" dirty="0">
-                <a:latin typeface="Times New Roman" panose="02020603050405020304" pitchFamily="18" charset="0"/>
-                <a:cs typeface="Times New Roman" panose="02020603050405020304" pitchFamily="18" charset="0"/>
-              </a:rPr>
-              <a:t>wrapper class – a built-in Java class that turns a Java primitive type into an object version of the primitive type, e.g., Integer wrapper class is an object version of the primitive type </a:t>
-            </a:r>
-            <a:r>
-              <a:rPr lang="en-US" sz="1600" dirty="0">
-                <a:latin typeface="Courier New" panose="02070309020205020404" pitchFamily="49" charset="0"/>
-                <a:cs typeface="Courier New" panose="02070309020205020404" pitchFamily="49" charset="0"/>
-              </a:rPr>
-              <a:t>int</a:t>
-            </a:r>
-            <a:endParaRPr lang="en-US" sz="1600" dirty="0">
-              <a:latin typeface="Times New Roman" panose="02020603050405020304" pitchFamily="18" charset="0"/>
-              <a:cs typeface="Times New Roman" panose="02020603050405020304" pitchFamily="18" charset="0"/>
-            </a:endParaRPr>
-          </a:p>
-        </p:txBody>
-      </p:sp>
-      <p:pic>
-        <p:nvPicPr>
-          <p:cNvPr id="4" name="Picture 3">
-            <a:extLst>
-              <a:ext uri="{FF2B5EF4-FFF2-40B4-BE49-F238E27FC236}">
-                <a16:creationId xmlns:a16="http://schemas.microsoft.com/office/drawing/2014/main" id="{F1354897-F98E-4ED6-55C9-F94EE209A92A}"/>
-              </a:ext>
-            </a:extLst>
-          </p:cNvPr>
-          <p:cNvPicPr>
-            <a:picLocks noChangeAspect="1"/>
-          </p:cNvPicPr>
-          <p:nvPr/>
-        </p:nvPicPr>
-        <p:blipFill>
-          <a:blip r:embed="rId3"/>
-          <a:stretch>
-            <a:fillRect/>
-          </a:stretch>
-        </p:blipFill>
-        <p:spPr>
-          <a:xfrm>
-            <a:off x="142503" y="4845137"/>
-            <a:ext cx="8075221" cy="1421021"/>
-          </a:xfrm>
-          <a:prstGeom prst="rect">
-            <a:avLst/>
-          </a:prstGeom>
-        </p:spPr>
-      </p:pic>
-      <mc:AlternateContent xmlns:mc="http://schemas.openxmlformats.org/markup-compatibility/2006" xmlns:p14="http://schemas.microsoft.com/office/powerpoint/2010/main">
-        <mc:Choice Requires="p14">
-          <p:contentPart p14:bwMode="auto" r:id="rId4">
+      <mc:AlternateContent xmlns:mc="http://schemas.openxmlformats.org/markup-compatibility/2006">
+        <mc:Choice xmlns:p14="http://schemas.microsoft.com/office/powerpoint/2010/main" Requires="p14">
+          <p:contentPart p14:bwMode="auto" r:id="rId3">
             <p14:nvContentPartPr>
-              <p14:cNvPr id="5" name="Ink 4">
+              <p14:cNvPr id="9" name="Ink 8">
                 <a:extLst>
                   <a:ext uri="{FF2B5EF4-FFF2-40B4-BE49-F238E27FC236}">
-                    <a16:creationId xmlns:a16="http://schemas.microsoft.com/office/drawing/2014/main" id="{058DE7B3-6FB7-6120-DF37-824F16F019A5}"/>
+                    <a16:creationId xmlns:a16="http://schemas.microsoft.com/office/drawing/2014/main" id="{5B34C00B-0E5B-7037-F9C3-A0114BDE2D2B}"/>
                   </a:ext>
                 </a:extLst>
               </p14:cNvPr>
@@ -5420,18 +4667,18 @@
               <p14:nvPr/>
             </p14:nvContentPartPr>
             <p14:xfrm>
-              <a:off x="1567253" y="1697110"/>
-              <a:ext cx="3933000" cy="110160"/>
+              <a:off x="3558069" y="3645943"/>
+              <a:ext cx="2572200" cy="1155600"/>
             </p14:xfrm>
           </p:contentPart>
         </mc:Choice>
-        <mc:Fallback xmlns="">
+        <mc:Fallback>
           <p:pic>
             <p:nvPicPr>
-              <p:cNvPr id="5" name="Ink 4">
+              <p:cNvPr id="9" name="Ink 8">
                 <a:extLst>
                   <a:ext uri="{FF2B5EF4-FFF2-40B4-BE49-F238E27FC236}">
-                    <a16:creationId xmlns:a16="http://schemas.microsoft.com/office/drawing/2014/main" id="{058DE7B3-6FB7-6120-DF37-824F16F019A5}"/>
+                    <a16:creationId xmlns:a16="http://schemas.microsoft.com/office/drawing/2014/main" id="{5B34C00B-0E5B-7037-F9C3-A0114BDE2D2B}"/>
                   </a:ext>
                 </a:extLst>
               </p:cNvPr>
@@ -5439,66 +4686,15 @@
               <p:nvPr/>
             </p:nvPicPr>
             <p:blipFill>
-              <a:blip r:embed="rId5"/>
+              <a:blip r:embed="rId4"/>
               <a:stretch>
                 <a:fillRect/>
               </a:stretch>
             </p:blipFill>
             <p:spPr>
               <a:xfrm>
-                <a:off x="1558613" y="1688470"/>
-                <a:ext cx="3950640" cy="127800"/>
-              </a:xfrm>
-              <a:prstGeom prst="rect">
-                <a:avLst/>
-              </a:prstGeom>
-            </p:spPr>
-          </p:pic>
-        </mc:Fallback>
-      </mc:AlternateContent>
-      <mc:AlternateContent xmlns:mc="http://schemas.openxmlformats.org/markup-compatibility/2006" xmlns:p14="http://schemas.microsoft.com/office/powerpoint/2010/main">
-        <mc:Choice Requires="p14">
-          <p:contentPart p14:bwMode="auto" r:id="rId6">
-            <p14:nvContentPartPr>
-              <p14:cNvPr id="7" name="Ink 6">
-                <a:extLst>
-                  <a:ext uri="{FF2B5EF4-FFF2-40B4-BE49-F238E27FC236}">
-                    <a16:creationId xmlns:a16="http://schemas.microsoft.com/office/drawing/2014/main" id="{01B2F43A-B4A1-BB82-3E79-23732C54DDAC}"/>
-                  </a:ext>
-                </a:extLst>
-              </p14:cNvPr>
-              <p14:cNvContentPartPr/>
-              <p14:nvPr/>
-            </p14:nvContentPartPr>
-            <p14:xfrm>
-              <a:off x="5390813" y="1328830"/>
-              <a:ext cx="2344680" cy="3981600"/>
-            </p14:xfrm>
-          </p:contentPart>
-        </mc:Choice>
-        <mc:Fallback xmlns="">
-          <p:pic>
-            <p:nvPicPr>
-              <p:cNvPr id="7" name="Ink 6">
-                <a:extLst>
-                  <a:ext uri="{FF2B5EF4-FFF2-40B4-BE49-F238E27FC236}">
-                    <a16:creationId xmlns:a16="http://schemas.microsoft.com/office/drawing/2014/main" id="{01B2F43A-B4A1-BB82-3E79-23732C54DDAC}"/>
-                  </a:ext>
-                </a:extLst>
-              </p:cNvPr>
-              <p:cNvPicPr/>
-              <p:nvPr/>
-            </p:nvPicPr>
-            <p:blipFill>
-              <a:blip r:embed="rId7"/>
-              <a:stretch>
-                <a:fillRect/>
-              </a:stretch>
-            </p:blipFill>
-            <p:spPr>
-              <a:xfrm>
-                <a:off x="5381813" y="1320190"/>
-                <a:ext cx="2362320" cy="3999240"/>
+                <a:off x="3540069" y="3628303"/>
+                <a:ext cx="2607840" cy="1191240"/>
               </a:xfrm>
               <a:prstGeom prst="rect">
                 <a:avLst/>
@@ -5510,7 +4706,7 @@
     </p:spTree>
     <p:extLst>
       <p:ext uri="{BB962C8B-B14F-4D97-AF65-F5344CB8AC3E}">
-        <p14:creationId xmlns:p14="http://schemas.microsoft.com/office/powerpoint/2010/main" val="2020023784"/>
+        <p14:creationId xmlns:p14="http://schemas.microsoft.com/office/powerpoint/2010/main" val="2875033241"/>
       </p:ext>
     </p:extLst>
   </p:cSld>
@@ -7225,7 +6421,7 @@
           </a:ln>
           <a:extLst>
             <a:ext uri="{C572A759-6A51-4108-AA02-DFA0A04FC94B}">
-              <ma14:wrappingTextBoxFlag xmlns="" xmlns:ma14="http://schemas.microsoft.com/office/mac/drawingml/2011/main" val="1"/>
+              <ma14:wrappingTextBoxFlag xmlns:ma14="http://schemas.microsoft.com/office/mac/drawingml/2011/main" xmlns="" val="1"/>
             </a:ext>
           </a:extLst>
         </p:spPr>
@@ -7447,7 +6643,7 @@
               <a:effectLst/>
               <a:extLst>
                 <a:ext uri="{C572A759-6A51-4108-AA02-DFA0A04FC94B}">
-                  <ma14:wrappingTextBoxFlag xmlns="" xmlns:ma14="http://schemas.microsoft.com/office/mac/drawingml/2011/main" val="1"/>
+                  <ma14:wrappingTextBoxFlag xmlns:ma14="http://schemas.microsoft.com/office/mac/drawingml/2011/main" xmlns="" val="1"/>
                 </a:ext>
               </a:extLst>
             </p:spPr>
@@ -7626,7 +6822,7 @@
               <a:effectLst/>
               <a:extLst>
                 <a:ext uri="{C572A759-6A51-4108-AA02-DFA0A04FC94B}">
-                  <ma14:wrappingTextBoxFlag xmlns="" xmlns:ma14="http://schemas.microsoft.com/office/mac/drawingml/2011/main" val="1"/>
+                  <ma14:wrappingTextBoxFlag xmlns:ma14="http://schemas.microsoft.com/office/mac/drawingml/2011/main" xmlns="" val="1"/>
                 </a:ext>
               </a:extLst>
             </p:spPr>
@@ -7796,7 +6992,7 @@
               <a:effectLst/>
               <a:extLst>
                 <a:ext uri="{C572A759-6A51-4108-AA02-DFA0A04FC94B}">
-                  <ma14:wrappingTextBoxFlag xmlns="" xmlns:ma14="http://schemas.microsoft.com/office/mac/drawingml/2011/main" val="1"/>
+                  <ma14:wrappingTextBoxFlag xmlns:ma14="http://schemas.microsoft.com/office/mac/drawingml/2011/main" xmlns="" val="1"/>
                 </a:ext>
               </a:extLst>
             </p:spPr>
@@ -7984,7 +7180,7 @@
               <a:effectLst/>
               <a:extLst>
                 <a:ext uri="{C572A759-6A51-4108-AA02-DFA0A04FC94B}">
-                  <ma14:wrappingTextBoxFlag xmlns="" xmlns:ma14="http://schemas.microsoft.com/office/mac/drawingml/2011/main" val="1"/>
+                  <ma14:wrappingTextBoxFlag xmlns:ma14="http://schemas.microsoft.com/office/mac/drawingml/2011/main" xmlns="" val="1"/>
                 </a:ext>
               </a:extLst>
             </p:spPr>
@@ -8129,7 +7325,7 @@
             <a:effectLst/>
             <a:extLst>
               <a:ext uri="{C572A759-6A51-4108-AA02-DFA0A04FC94B}">
-                <ma14:wrappingTextBoxFlag xmlns="" xmlns:ma14="http://schemas.microsoft.com/office/mac/drawingml/2011/main" val="1"/>
+                <ma14:wrappingTextBoxFlag xmlns:ma14="http://schemas.microsoft.com/office/mac/drawingml/2011/main" xmlns="" val="1"/>
               </a:ext>
             </a:extLst>
           </p:spPr>
@@ -8297,10 +7493,10 @@
       </p:sp>
       <p:pic>
         <p:nvPicPr>
-          <p:cNvPr id="4" name="Picture 3">
+          <p:cNvPr id="6" name="Picture 5">
             <a:extLst>
               <a:ext uri="{FF2B5EF4-FFF2-40B4-BE49-F238E27FC236}">
-                <a16:creationId xmlns:a16="http://schemas.microsoft.com/office/drawing/2014/main" id="{5B9E5D65-6C33-A33D-DEE4-CCB7A03A2A19}"/>
+                <a16:creationId xmlns:a16="http://schemas.microsoft.com/office/drawing/2014/main" id="{901FBCBA-8EC9-66EA-510A-8FEABB1F9E1D}"/>
               </a:ext>
             </a:extLst>
           </p:cNvPr>
@@ -8317,14 +7513,121 @@
         </p:blipFill>
         <p:spPr>
           <a:xfrm>
-            <a:off x="4673599" y="1592544"/>
-            <a:ext cx="4245897" cy="3117241"/>
+            <a:off x="4791631" y="1608669"/>
+            <a:ext cx="4245898" cy="2639645"/>
           </a:xfrm>
           <a:prstGeom prst="rect">
             <a:avLst/>
           </a:prstGeom>
+          <a:ln>
+            <a:solidFill>
+              <a:srgbClr val="00B0F0"/>
+            </a:solidFill>
+          </a:ln>
         </p:spPr>
       </p:pic>
+      <mc:AlternateContent xmlns:mc="http://schemas.openxmlformats.org/markup-compatibility/2006">
+        <mc:Choice xmlns:p14="http://schemas.microsoft.com/office/powerpoint/2010/main" Requires="p14">
+          <p:contentPart p14:bwMode="auto" r:id="rId3">
+            <p14:nvContentPartPr>
+              <p14:cNvPr id="7" name="Ink 6">
+                <a:extLst>
+                  <a:ext uri="{FF2B5EF4-FFF2-40B4-BE49-F238E27FC236}">
+                    <a16:creationId xmlns:a16="http://schemas.microsoft.com/office/drawing/2014/main" id="{56C456C2-F428-111B-C116-11F7ADF5F1FD}"/>
+                  </a:ext>
+                </a:extLst>
+              </p14:cNvPr>
+              <p14:cNvContentPartPr/>
+              <p14:nvPr/>
+            </p14:nvContentPartPr>
+            <p14:xfrm>
+              <a:off x="5601429" y="2894794"/>
+              <a:ext cx="1771560" cy="272880"/>
+            </p14:xfrm>
+          </p:contentPart>
+        </mc:Choice>
+        <mc:Fallback>
+          <p:pic>
+            <p:nvPicPr>
+              <p:cNvPr id="7" name="Ink 6">
+                <a:extLst>
+                  <a:ext uri="{FF2B5EF4-FFF2-40B4-BE49-F238E27FC236}">
+                    <a16:creationId xmlns:a16="http://schemas.microsoft.com/office/drawing/2014/main" id="{56C456C2-F428-111B-C116-11F7ADF5F1FD}"/>
+                  </a:ext>
+                </a:extLst>
+              </p:cNvPr>
+              <p:cNvPicPr/>
+              <p:nvPr/>
+            </p:nvPicPr>
+            <p:blipFill>
+              <a:blip r:embed="rId4"/>
+              <a:stretch>
+                <a:fillRect/>
+              </a:stretch>
+            </p:blipFill>
+            <p:spPr>
+              <a:xfrm>
+                <a:off x="5583429" y="2876794"/>
+                <a:ext cx="1807200" cy="308520"/>
+              </a:xfrm>
+              <a:prstGeom prst="rect">
+                <a:avLst/>
+              </a:prstGeom>
+            </p:spPr>
+          </p:pic>
+        </mc:Fallback>
+      </mc:AlternateContent>
+      <mc:AlternateContent xmlns:mc="http://schemas.openxmlformats.org/markup-compatibility/2006">
+        <mc:Choice xmlns:p14="http://schemas.microsoft.com/office/powerpoint/2010/main" Requires="p14">
+          <p:contentPart p14:bwMode="auto" r:id="rId5">
+            <p14:nvContentPartPr>
+              <p14:cNvPr id="8" name="Ink 7">
+                <a:extLst>
+                  <a:ext uri="{FF2B5EF4-FFF2-40B4-BE49-F238E27FC236}">
+                    <a16:creationId xmlns:a16="http://schemas.microsoft.com/office/drawing/2014/main" id="{21EF0E87-17A4-2C2E-EC5E-911F282720AA}"/>
+                  </a:ext>
+                </a:extLst>
+              </p14:cNvPr>
+              <p14:cNvContentPartPr/>
+              <p14:nvPr/>
+            </p14:nvContentPartPr>
+            <p14:xfrm>
+              <a:off x="5475429" y="3438034"/>
+              <a:ext cx="2233800" cy="307440"/>
+            </p14:xfrm>
+          </p:contentPart>
+        </mc:Choice>
+        <mc:Fallback>
+          <p:pic>
+            <p:nvPicPr>
+              <p:cNvPr id="8" name="Ink 7">
+                <a:extLst>
+                  <a:ext uri="{FF2B5EF4-FFF2-40B4-BE49-F238E27FC236}">
+                    <a16:creationId xmlns:a16="http://schemas.microsoft.com/office/drawing/2014/main" id="{21EF0E87-17A4-2C2E-EC5E-911F282720AA}"/>
+                  </a:ext>
+                </a:extLst>
+              </p:cNvPr>
+              <p:cNvPicPr/>
+              <p:nvPr/>
+            </p:nvPicPr>
+            <p:blipFill>
+              <a:blip r:embed="rId6"/>
+              <a:stretch>
+                <a:fillRect/>
+              </a:stretch>
+            </p:blipFill>
+            <p:spPr>
+              <a:xfrm>
+                <a:off x="5457429" y="3420394"/>
+                <a:ext cx="2269440" cy="343080"/>
+              </a:xfrm>
+              <a:prstGeom prst="rect">
+                <a:avLst/>
+              </a:prstGeom>
+            </p:spPr>
+          </p:pic>
+        </mc:Fallback>
+      </mc:AlternateContent>
     </p:spTree>
     <p:extLst>
       <p:ext uri="{BB962C8B-B14F-4D97-AF65-F5344CB8AC3E}">
@@ -8979,15 +8282,6 @@
 </file>
 
 <file path=customXml/item1.xml><?xml version="1.0" encoding="utf-8"?>
-<?mso-contentType ?>
-<FormTemplates xmlns="http://schemas.microsoft.com/sharepoint/v3/contenttype/forms">
-  <Display>DocumentLibraryForm</Display>
-  <Edit>DocumentLibraryForm</Edit>
-  <New>DocumentLibraryForm</New>
-</FormTemplates>
-</file>
-
-<file path=customXml/item2.xml><?xml version="1.0" encoding="utf-8"?>
 <ct:contentTypeSchema xmlns:ct="http://schemas.microsoft.com/office/2006/metadata/contentType" xmlns:ma="http://schemas.microsoft.com/office/2006/metadata/properties/metaAttributes" ct:_="" ma:_="" ma:contentTypeName="Document" ma:contentTypeID="0x0101004285D81DBE5F5A448E892B34D6B8CF20" ma:contentTypeVersion="2" ma:contentTypeDescription="Create a new document." ma:contentTypeScope="" ma:versionID="026ccaf10de5d9915dfa48c6db16b59b">
   <xsd:schema xmlns:xsd="http://www.w3.org/2001/XMLSchema" xmlns:xs="http://www.w3.org/2001/XMLSchema" xmlns:p="http://schemas.microsoft.com/office/2006/metadata/properties" xmlns:ns2="08600313-7276-4ca7-b5d3-7d86193ee0ac" targetNamespace="http://schemas.microsoft.com/office/2006/metadata/properties" ma:root="true" ma:fieldsID="c887e4ee215f388544e22a2030d7ea35" ns2:_="">
     <xsd:import namespace="08600313-7276-4ca7-b5d3-7d86193ee0ac"/>
@@ -9119,6 +8413,15 @@
 </ct:contentTypeSchema>
 </file>
 
+<file path=customXml/item2.xml><?xml version="1.0" encoding="utf-8"?>
+<?mso-contentType ?>
+<FormTemplates xmlns="http://schemas.microsoft.com/sharepoint/v3/contenttype/forms">
+  <Display>DocumentLibraryForm</Display>
+  <Edit>DocumentLibraryForm</Edit>
+  <New>DocumentLibraryForm</New>
+</FormTemplates>
+</file>
+
 <file path=customXml/item3.xml><?xml version="1.0" encoding="utf-8"?>
 <p:properties xmlns:p="http://schemas.microsoft.com/office/2006/metadata/properties" xmlns:xsi="http://www.w3.org/2001/XMLSchema-instance" xmlns:pc="http://schemas.microsoft.com/office/infopath/2007/PartnerControls">
   <documentManagement/>
@@ -9126,14 +8429,6 @@
 </file>
 
 <file path=customXml/itemProps1.xml><?xml version="1.0" encoding="utf-8"?>
-<ds:datastoreItem xmlns:ds="http://schemas.openxmlformats.org/officeDocument/2006/customXml" ds:itemID="{91B7F2D7-28F4-40DC-BF4D-A63582936AC7}">
-  <ds:schemaRefs>
-    <ds:schemaRef ds:uri="http://schemas.microsoft.com/sharepoint/v3/contenttype/forms"/>
-  </ds:schemaRefs>
-</ds:datastoreItem>
-</file>
-
-<file path=customXml/itemProps2.xml><?xml version="1.0" encoding="utf-8"?>
 <ds:datastoreItem xmlns:ds="http://schemas.openxmlformats.org/officeDocument/2006/customXml" ds:itemID="{86AFFBF5-1744-4DD8-AF35-1BECDBB21948}">
   <ds:schemaRefs>
     <ds:schemaRef ds:uri="http://schemas.microsoft.com/office/2006/metadata/contentType"/>
@@ -9151,6 +8446,14 @@
 </ds:datastoreItem>
 </file>
 
+<file path=customXml/itemProps2.xml><?xml version="1.0" encoding="utf-8"?>
+<ds:datastoreItem xmlns:ds="http://schemas.openxmlformats.org/officeDocument/2006/customXml" ds:itemID="{91B7F2D7-28F4-40DC-BF4D-A63582936AC7}">
+  <ds:schemaRefs>
+    <ds:schemaRef ds:uri="http://schemas.microsoft.com/sharepoint/v3/contenttype/forms"/>
+  </ds:schemaRefs>
+</ds:datastoreItem>
+</file>
+
 <file path=customXml/itemProps3.xml><?xml version="1.0" encoding="utf-8"?>
 <ds:datastoreItem xmlns:ds="http://schemas.openxmlformats.org/officeDocument/2006/customXml" ds:itemID="{4CB9D0C4-1816-48BB-B7D3-B65D006E1708}">
   <ds:schemaRefs>

</xml_diff>

<commit_message>
fixing Maps day slides and including documentation of classes since this is the day to practice it
</commit_message>
<xml_diff>
--- a/ClassMaterials/MapsAndObjectIntro/Slides/Part1-ObjectIntro.pptx
+++ b/ClassMaterials/MapsAndObjectIntro/Slides/Part1-ObjectIntro.pptx
@@ -5,7 +5,7 @@
     <p:sldMasterId id="2147483648" r:id="rId4"/>
   </p:sldMasterIdLst>
   <p:notesMasterIdLst>
-    <p:notesMasterId r:id="rId15"/>
+    <p:notesMasterId r:id="rId16"/>
   </p:notesMasterIdLst>
   <p:sldIdLst>
     <p:sldId id="256" r:id="rId5"/>
@@ -17,7 +17,8 @@
     <p:sldId id="297" r:id="rId11"/>
     <p:sldId id="295" r:id="rId12"/>
     <p:sldId id="296" r:id="rId13"/>
-    <p:sldId id="309" r:id="rId14"/>
+    <p:sldId id="310" r:id="rId14"/>
+    <p:sldId id="309" r:id="rId15"/>
   </p:sldIdLst>
   <p:sldSz cx="9144000" cy="6858000" type="screen4x3"/>
   <p:notesSz cx="6858000" cy="9144000"/>
@@ -708,7 +709,7 @@
           <a:p>
             <a:fld id="{73386005-8F80-1A49-87D1-22EBFA47E352}" type="datetimeFigureOut">
               <a:rPr lang="en-US" smtClean="0"/>
-              <a:t>3/3/2025</a:t>
+              <a:t>3/14/2025</a:t>
             </a:fld>
             <a:endParaRPr lang="en-US"/>
           </a:p>
@@ -1572,7 +1573,7 @@
           <a:p>
             <a:fld id="{5B07E745-2C70-2943-8487-A8F6E88ADF5E}" type="datetimeFigureOut">
               <a:rPr lang="en-US" smtClean="0"/>
-              <a:t>3/3/2025</a:t>
+              <a:t>3/14/2025</a:t>
             </a:fld>
             <a:endParaRPr lang="en-US"/>
           </a:p>
@@ -1740,7 +1741,7 @@
           <a:p>
             <a:fld id="{5B07E745-2C70-2943-8487-A8F6E88ADF5E}" type="datetimeFigureOut">
               <a:rPr lang="en-US" smtClean="0"/>
-              <a:t>3/3/2025</a:t>
+              <a:t>3/14/2025</a:t>
             </a:fld>
             <a:endParaRPr lang="en-US"/>
           </a:p>
@@ -1918,7 +1919,7 @@
           <a:p>
             <a:fld id="{5B07E745-2C70-2943-8487-A8F6E88ADF5E}" type="datetimeFigureOut">
               <a:rPr lang="en-US" smtClean="0"/>
-              <a:t>3/3/2025</a:t>
+              <a:t>3/14/2025</a:t>
             </a:fld>
             <a:endParaRPr lang="en-US"/>
           </a:p>
@@ -2086,7 +2087,7 @@
           <a:p>
             <a:fld id="{5B07E745-2C70-2943-8487-A8F6E88ADF5E}" type="datetimeFigureOut">
               <a:rPr lang="en-US" smtClean="0"/>
-              <a:t>3/3/2025</a:t>
+              <a:t>3/14/2025</a:t>
             </a:fld>
             <a:endParaRPr lang="en-US"/>
           </a:p>
@@ -2331,7 +2332,7 @@
           <a:p>
             <a:fld id="{5B07E745-2C70-2943-8487-A8F6E88ADF5E}" type="datetimeFigureOut">
               <a:rPr lang="en-US" smtClean="0"/>
-              <a:t>3/3/2025</a:t>
+              <a:t>3/14/2025</a:t>
             </a:fld>
             <a:endParaRPr lang="en-US"/>
           </a:p>
@@ -2616,7 +2617,7 @@
           <a:p>
             <a:fld id="{5B07E745-2C70-2943-8487-A8F6E88ADF5E}" type="datetimeFigureOut">
               <a:rPr lang="en-US" smtClean="0"/>
-              <a:t>3/3/2025</a:t>
+              <a:t>3/14/2025</a:t>
             </a:fld>
             <a:endParaRPr lang="en-US"/>
           </a:p>
@@ -3035,7 +3036,7 @@
           <a:p>
             <a:fld id="{5B07E745-2C70-2943-8487-A8F6E88ADF5E}" type="datetimeFigureOut">
               <a:rPr lang="en-US" smtClean="0"/>
-              <a:t>3/3/2025</a:t>
+              <a:t>3/14/2025</a:t>
             </a:fld>
             <a:endParaRPr lang="en-US"/>
           </a:p>
@@ -3152,7 +3153,7 @@
           <a:p>
             <a:fld id="{5B07E745-2C70-2943-8487-A8F6E88ADF5E}" type="datetimeFigureOut">
               <a:rPr lang="en-US" smtClean="0"/>
-              <a:t>3/3/2025</a:t>
+              <a:t>3/14/2025</a:t>
             </a:fld>
             <a:endParaRPr lang="en-US"/>
           </a:p>
@@ -3247,7 +3248,7 @@
           <a:p>
             <a:fld id="{5B07E745-2C70-2943-8487-A8F6E88ADF5E}" type="datetimeFigureOut">
               <a:rPr lang="en-US" smtClean="0"/>
-              <a:t>3/3/2025</a:t>
+              <a:t>3/14/2025</a:t>
             </a:fld>
             <a:endParaRPr lang="en-US"/>
           </a:p>
@@ -3522,7 +3523,7 @@
           <a:p>
             <a:fld id="{5B07E745-2C70-2943-8487-A8F6E88ADF5E}" type="datetimeFigureOut">
               <a:rPr lang="en-US" smtClean="0"/>
-              <a:t>3/3/2025</a:t>
+              <a:t>3/14/2025</a:t>
             </a:fld>
             <a:endParaRPr lang="en-US"/>
           </a:p>
@@ -3774,7 +3775,7 @@
           <a:p>
             <a:fld id="{5B07E745-2C70-2943-8487-A8F6E88ADF5E}" type="datetimeFigureOut">
               <a:rPr lang="en-US" smtClean="0"/>
-              <a:t>3/3/2025</a:t>
+              <a:t>3/14/2025</a:t>
             </a:fld>
             <a:endParaRPr lang="en-US"/>
           </a:p>
@@ -3985,7 +3986,7 @@
           <a:p>
             <a:fld id="{5B07E745-2C70-2943-8487-A8F6E88ADF5E}" type="datetimeFigureOut">
               <a:rPr lang="en-US" smtClean="0"/>
-              <a:t>3/3/2025</a:t>
+              <a:t>3/14/2025</a:t>
             </a:fld>
             <a:endParaRPr lang="en-US"/>
           </a:p>
@@ -4472,6 +4473,102 @@
           </a:p>
         </p:txBody>
       </p:sp>
+      <p:sp>
+        <p:nvSpPr>
+          <p:cNvPr id="14" name="TextBox 13">
+            <a:extLst>
+              <a:ext uri="{FF2B5EF4-FFF2-40B4-BE49-F238E27FC236}">
+                <a16:creationId xmlns:a16="http://schemas.microsoft.com/office/drawing/2014/main" id="{94ADEE29-10ED-D5AE-95E8-CF89E6CE1EDA}"/>
+              </a:ext>
+            </a:extLst>
+          </p:cNvPr>
+          <p:cNvSpPr txBox="1"/>
+          <p:nvPr/>
+        </p:nvSpPr>
+        <p:spPr>
+          <a:xfrm>
+            <a:off x="1356633" y="39389"/>
+            <a:ext cx="4619625" cy="1046440"/>
+          </a:xfrm>
+          <a:prstGeom prst="rect">
+            <a:avLst/>
+          </a:prstGeom>
+          <a:noFill/>
+          <a:ln w="12700" cap="flat">
+            <a:noFill/>
+            <a:miter lim="400000"/>
+          </a:ln>
+          <a:effectLst/>
+        </p:spPr>
+        <p:style>
+          <a:lnRef idx="0">
+            <a:scrgbClr r="0" g="0" b="0"/>
+          </a:lnRef>
+          <a:fillRef idx="0">
+            <a:scrgbClr r="0" g="0" b="0"/>
+          </a:fillRef>
+          <a:effectRef idx="0">
+            <a:scrgbClr r="0" g="0" b="0"/>
+          </a:effectRef>
+          <a:fontRef idx="none"/>
+        </p:style>
+        <p:txBody>
+          <a:bodyPr wrap="square">
+            <a:spAutoFit/>
+          </a:bodyPr>
+          <a:lstStyle/>
+          <a:p>
+            <a:r>
+              <a:rPr lang="en-US" dirty="0">
+                <a:highlight>
+                  <a:srgbClr val="FFFF00"/>
+                </a:highlight>
+              </a:rPr>
+              <a:t>Today’s Attendance password</a:t>
+            </a:r>
+          </a:p>
+          <a:p>
+            <a:r>
+              <a:rPr lang="en-US" sz="4400" dirty="0">
+                <a:highlight>
+                  <a:srgbClr val="FFFF00"/>
+                </a:highlight>
+              </a:rPr>
+              <a:t>__________</a:t>
+            </a:r>
+          </a:p>
+        </p:txBody>
+      </p:sp>
+      <p:pic>
+        <p:nvPicPr>
+          <p:cNvPr id="15" name="Picture 14">
+            <a:extLst>
+              <a:ext uri="{FF2B5EF4-FFF2-40B4-BE49-F238E27FC236}">
+                <a16:creationId xmlns:a16="http://schemas.microsoft.com/office/drawing/2014/main" id="{6FEC76AD-DF1D-26CD-0792-73ABDFDB313B}"/>
+              </a:ext>
+            </a:extLst>
+          </p:cNvPr>
+          <p:cNvPicPr>
+            <a:picLocks noChangeAspect="1"/>
+          </p:cNvPicPr>
+          <p:nvPr/>
+        </p:nvPicPr>
+        <p:blipFill>
+          <a:blip r:embed="rId2"/>
+          <a:stretch>
+            <a:fillRect/>
+          </a:stretch>
+        </p:blipFill>
+        <p:spPr>
+          <a:xfrm>
+            <a:off x="6242209" y="0"/>
+            <a:ext cx="2816626" cy="2439173"/>
+          </a:xfrm>
+          <a:prstGeom prst="rect">
+            <a:avLst/>
+          </a:prstGeom>
+        </p:spPr>
+      </p:pic>
     </p:spTree>
     <p:extLst>
       <p:ext uri="{BB962C8B-B14F-4D97-AF65-F5344CB8AC3E}">
@@ -4490,6 +4587,140 @@
   <p:cSld>
     <p:spTree>
       <p:nvGrpSpPr>
+        <p:cNvPr id="1" name="">
+          <a:extLst>
+            <a:ext uri="{FF2B5EF4-FFF2-40B4-BE49-F238E27FC236}">
+              <a16:creationId xmlns:a16="http://schemas.microsoft.com/office/drawing/2014/main" id="{A3A9CD4F-0047-0058-1184-E7B360223489}"/>
+            </a:ext>
+          </a:extLst>
+        </p:cNvPr>
+        <p:cNvGrpSpPr/>
+        <p:nvPr/>
+      </p:nvGrpSpPr>
+      <p:grpSpPr>
+        <a:xfrm>
+          <a:off x="0" y="0"/>
+          <a:ext cx="0" cy="0"/>
+          <a:chOff x="0" y="0"/>
+          <a:chExt cx="0" cy="0"/>
+        </a:xfrm>
+      </p:grpSpPr>
+      <p:sp>
+        <p:nvSpPr>
+          <p:cNvPr id="2" name="Title 1">
+            <a:extLst>
+              <a:ext uri="{FF2B5EF4-FFF2-40B4-BE49-F238E27FC236}">
+                <a16:creationId xmlns:a16="http://schemas.microsoft.com/office/drawing/2014/main" id="{B877EDBD-B50E-EB55-0CA2-CEB736911D61}"/>
+              </a:ext>
+            </a:extLst>
+          </p:cNvPr>
+          <p:cNvSpPr>
+            <a:spLocks noGrp="1"/>
+          </p:cNvSpPr>
+          <p:nvPr>
+            <p:ph type="title"/>
+          </p:nvPr>
+        </p:nvSpPr>
+        <p:spPr/>
+        <p:txBody>
+          <a:bodyPr/>
+          <a:lstStyle/>
+          <a:p>
+            <a:r>
+              <a:rPr lang="en-US" dirty="0"/>
+              <a:t>Additional Practice (1)</a:t>
+            </a:r>
+          </a:p>
+        </p:txBody>
+      </p:sp>
+      <p:sp>
+        <p:nvSpPr>
+          <p:cNvPr id="3" name="Content Placeholder 2">
+            <a:extLst>
+              <a:ext uri="{FF2B5EF4-FFF2-40B4-BE49-F238E27FC236}">
+                <a16:creationId xmlns:a16="http://schemas.microsoft.com/office/drawing/2014/main" id="{FA0F3DCB-759D-857C-07B7-16B13D84F48A}"/>
+              </a:ext>
+            </a:extLst>
+          </p:cNvPr>
+          <p:cNvSpPr>
+            <a:spLocks noGrp="1"/>
+          </p:cNvSpPr>
+          <p:nvPr>
+            <p:ph idx="1"/>
+          </p:nvPr>
+        </p:nvSpPr>
+        <p:spPr/>
+        <p:txBody>
+          <a:bodyPr/>
+          <a:lstStyle/>
+          <a:p>
+            <a:r>
+              <a:rPr lang="en-US" dirty="0"/>
+              <a:t>Create your own “</a:t>
+            </a:r>
+            <a:r>
+              <a:rPr lang="en-US" dirty="0" err="1"/>
+              <a:t>RoseString</a:t>
+            </a:r>
+            <a:r>
+              <a:rPr lang="en-US" dirty="0"/>
+              <a:t>” class!</a:t>
+            </a:r>
+          </a:p>
+          <a:p>
+            <a:pPr lvl="1"/>
+            <a:endParaRPr lang="en-US" dirty="0"/>
+          </a:p>
+        </p:txBody>
+      </p:sp>
+      <p:pic>
+        <p:nvPicPr>
+          <p:cNvPr id="7" name="Picture 6">
+            <a:extLst>
+              <a:ext uri="{FF2B5EF4-FFF2-40B4-BE49-F238E27FC236}">
+                <a16:creationId xmlns:a16="http://schemas.microsoft.com/office/drawing/2014/main" id="{3629A7A0-24A1-13BC-B189-4266AE146079}"/>
+              </a:ext>
+            </a:extLst>
+          </p:cNvPr>
+          <p:cNvPicPr>
+            <a:picLocks noChangeAspect="1"/>
+          </p:cNvPicPr>
+          <p:nvPr/>
+        </p:nvPicPr>
+        <p:blipFill>
+          <a:blip r:embed="rId2"/>
+          <a:stretch>
+            <a:fillRect/>
+          </a:stretch>
+        </p:blipFill>
+        <p:spPr>
+          <a:xfrm>
+            <a:off x="303630" y="2749131"/>
+            <a:ext cx="8383170" cy="2753109"/>
+          </a:xfrm>
+          <a:prstGeom prst="rect">
+            <a:avLst/>
+          </a:prstGeom>
+        </p:spPr>
+      </p:pic>
+    </p:spTree>
+    <p:extLst>
+      <p:ext uri="{BB962C8B-B14F-4D97-AF65-F5344CB8AC3E}">
+        <p14:creationId xmlns:p14="http://schemas.microsoft.com/office/powerpoint/2010/main" val="2271777387"/>
+      </p:ext>
+    </p:extLst>
+  </p:cSld>
+  <p:clrMapOvr>
+    <a:masterClrMapping/>
+  </p:clrMapOvr>
+</p:sld>
+</file>
+
+<file path=ppt/slides/slide11.xml><?xml version="1.0" encoding="utf-8"?>
+<p:sld xmlns:a="http://schemas.openxmlformats.org/drawingml/2006/main" xmlns:r="http://schemas.openxmlformats.org/officeDocument/2006/relationships" xmlns:p="http://schemas.openxmlformats.org/presentationml/2006/main">
+  <p:cSld>
+    <p:spTree>
+      <p:nvGrpSpPr>
         <p:cNvPr id="1" name=""/>
         <p:cNvGrpSpPr/>
         <p:nvPr/>
@@ -4525,7 +4756,7 @@
           <a:p>
             <a:r>
               <a:rPr lang="en-US" dirty="0"/>
-              <a:t>Additional Practice</a:t>
+              <a:t>Additional Practice (2)</a:t>
             </a:r>
           </a:p>
         </p:txBody>
@@ -4652,8 +4883,8 @@
           </a:prstGeom>
         </p:spPr>
       </p:pic>
-      <mc:AlternateContent xmlns:mc="http://schemas.openxmlformats.org/markup-compatibility/2006">
-        <mc:Choice xmlns:p14="http://schemas.microsoft.com/office/powerpoint/2010/main" Requires="p14">
+      <mc:AlternateContent xmlns:mc="http://schemas.openxmlformats.org/markup-compatibility/2006" xmlns:p14="http://schemas.microsoft.com/office/powerpoint/2010/main">
+        <mc:Choice Requires="p14">
           <p:contentPart p14:bwMode="auto" r:id="rId3">
             <p14:nvContentPartPr>
               <p14:cNvPr id="9" name="Ink 8">
@@ -4672,7 +4903,7 @@
             </p14:xfrm>
           </p:contentPart>
         </mc:Choice>
-        <mc:Fallback>
+        <mc:Fallback xmlns="">
           <p:pic>
             <p:nvPicPr>
               <p:cNvPr id="9" name="Ink 8">
@@ -5442,6 +5673,18 @@
           <a:lstStyle/>
           <a:p>
             <a:r>
+              <a:rPr lang="en-US" b="1" dirty="0">
+                <a:solidFill>
+                  <a:srgbClr val="0070C0"/>
+                </a:solidFill>
+                <a:latin typeface="Courier New" pitchFamily="49" charset="0"/>
+                <a:cs typeface="Courier New" pitchFamily="49" charset="0"/>
+              </a:rPr>
+              <a:t>ArrayList&lt;Integer&gt; scores = new ArrayList&lt;&gt;();</a:t>
+            </a:r>
+          </a:p>
+          <a:p>
+            <a:r>
               <a:rPr lang="en-US" b="1" dirty="0" err="1">
                 <a:solidFill>
                   <a:srgbClr val="0070C0"/>
@@ -5449,7 +5692,7 @@
                 <a:latin typeface="Courier New" pitchFamily="49" charset="0"/>
                 <a:cs typeface="Courier New" pitchFamily="49" charset="0"/>
               </a:rPr>
-              <a:t>HashMap</a:t>
+              <a:t>scores.add</a:t>
             </a:r>
             <a:r>
               <a:rPr lang="en-US" b="1" dirty="0">
@@ -5459,49 +5702,7 @@
                 <a:latin typeface="Courier New" pitchFamily="49" charset="0"/>
                 <a:cs typeface="Courier New" pitchFamily="49" charset="0"/>
               </a:rPr>
-              <a:t>&lt;String, Integer&gt; scores = new </a:t>
-            </a:r>
-            <a:r>
-              <a:rPr lang="en-US" b="1" dirty="0" err="1">
-                <a:solidFill>
-                  <a:srgbClr val="0070C0"/>
-                </a:solidFill>
-                <a:latin typeface="Courier New" pitchFamily="49" charset="0"/>
-                <a:cs typeface="Courier New" pitchFamily="49" charset="0"/>
-              </a:rPr>
-              <a:t>HashMap</a:t>
-            </a:r>
-            <a:r>
-              <a:rPr lang="en-US" b="1" dirty="0">
-                <a:solidFill>
-                  <a:srgbClr val="0070C0"/>
-                </a:solidFill>
-                <a:latin typeface="Courier New" pitchFamily="49" charset="0"/>
-                <a:cs typeface="Courier New" pitchFamily="49" charset="0"/>
-              </a:rPr>
-              <a:t>&lt;&gt;();</a:t>
-            </a:r>
-          </a:p>
-          <a:p>
-            <a:r>
-              <a:rPr lang="en-US" b="1" dirty="0" err="1">
-                <a:solidFill>
-                  <a:srgbClr val="0070C0"/>
-                </a:solidFill>
-                <a:latin typeface="Courier New" pitchFamily="49" charset="0"/>
-                <a:cs typeface="Courier New" pitchFamily="49" charset="0"/>
-              </a:rPr>
-              <a:t>scores.put</a:t>
-            </a:r>
-            <a:r>
-              <a:rPr lang="en-US" b="1" dirty="0">
-                <a:solidFill>
-                  <a:srgbClr val="0070C0"/>
-                </a:solidFill>
-                <a:latin typeface="Courier New" pitchFamily="49" charset="0"/>
-                <a:cs typeface="Courier New" pitchFamily="49" charset="0"/>
-              </a:rPr>
-              <a:t>(“Bob”, 78); // </a:t>
+              <a:t>(78); // </a:t>
             </a:r>
             <a:r>
               <a:rPr lang="en-US" b="1" i="1" dirty="0">
@@ -7526,8 +7727,8 @@
           </a:ln>
         </p:spPr>
       </p:pic>
-      <mc:AlternateContent xmlns:mc="http://schemas.openxmlformats.org/markup-compatibility/2006">
-        <mc:Choice xmlns:p14="http://schemas.microsoft.com/office/powerpoint/2010/main" Requires="p14">
+      <mc:AlternateContent xmlns:mc="http://schemas.openxmlformats.org/markup-compatibility/2006" xmlns:p14="http://schemas.microsoft.com/office/powerpoint/2010/main">
+        <mc:Choice Requires="p14">
           <p:contentPart p14:bwMode="auto" r:id="rId3">
             <p14:nvContentPartPr>
               <p14:cNvPr id="7" name="Ink 6">
@@ -7546,7 +7747,7 @@
             </p14:xfrm>
           </p:contentPart>
         </mc:Choice>
-        <mc:Fallback>
+        <mc:Fallback xmlns="">
           <p:pic>
             <p:nvPicPr>
               <p:cNvPr id="7" name="Ink 6">
@@ -7577,8 +7778,8 @@
           </p:pic>
         </mc:Fallback>
       </mc:AlternateContent>
-      <mc:AlternateContent xmlns:mc="http://schemas.openxmlformats.org/markup-compatibility/2006">
-        <mc:Choice xmlns:p14="http://schemas.microsoft.com/office/powerpoint/2010/main" Requires="p14">
+      <mc:AlternateContent xmlns:mc="http://schemas.openxmlformats.org/markup-compatibility/2006" xmlns:p14="http://schemas.microsoft.com/office/powerpoint/2010/main">
+        <mc:Choice Requires="p14">
           <p:contentPart p14:bwMode="auto" r:id="rId5">
             <p14:nvContentPartPr>
               <p14:cNvPr id="8" name="Ink 7">
@@ -7597,7 +7798,7 @@
             </p14:xfrm>
           </p:contentPart>
         </mc:Choice>
-        <mc:Fallback>
+        <mc:Fallback xmlns="">
           <p:pic>
             <p:nvPicPr>
               <p:cNvPr id="8" name="Ink 7">
@@ -8282,6 +8483,12 @@
 </file>
 
 <file path=customXml/item1.xml><?xml version="1.0" encoding="utf-8"?>
+<p:properties xmlns:p="http://schemas.microsoft.com/office/2006/metadata/properties" xmlns:xsi="http://www.w3.org/2001/XMLSchema-instance" xmlns:pc="http://schemas.microsoft.com/office/infopath/2007/PartnerControls">
+  <documentManagement/>
+</p:properties>
+</file>
+
+<file path=customXml/item2.xml><?xml version="1.0" encoding="utf-8"?>
 <ct:contentTypeSchema xmlns:ct="http://schemas.microsoft.com/office/2006/metadata/contentType" xmlns:ma="http://schemas.microsoft.com/office/2006/metadata/properties/metaAttributes" ct:_="" ma:_="" ma:contentTypeName="Document" ma:contentTypeID="0x0101004285D81DBE5F5A448E892B34D6B8CF20" ma:contentTypeVersion="2" ma:contentTypeDescription="Create a new document." ma:contentTypeScope="" ma:versionID="026ccaf10de5d9915dfa48c6db16b59b">
   <xsd:schema xmlns:xsd="http://www.w3.org/2001/XMLSchema" xmlns:xs="http://www.w3.org/2001/XMLSchema" xmlns:p="http://schemas.microsoft.com/office/2006/metadata/properties" xmlns:ns2="08600313-7276-4ca7-b5d3-7d86193ee0ac" targetNamespace="http://schemas.microsoft.com/office/2006/metadata/properties" ma:root="true" ma:fieldsID="c887e4ee215f388544e22a2030d7ea35" ns2:_="">
     <xsd:import namespace="08600313-7276-4ca7-b5d3-7d86193ee0ac"/>
@@ -8413,7 +8620,7 @@
 </ct:contentTypeSchema>
 </file>
 
-<file path=customXml/item2.xml><?xml version="1.0" encoding="utf-8"?>
+<file path=customXml/item3.xml><?xml version="1.0" encoding="utf-8"?>
 <?mso-contentType ?>
 <FormTemplates xmlns="http://schemas.microsoft.com/sharepoint/v3/contenttype/forms">
   <Display>DocumentLibraryForm</Display>
@@ -8422,13 +8629,16 @@
 </FormTemplates>
 </file>
 
-<file path=customXml/item3.xml><?xml version="1.0" encoding="utf-8"?>
-<p:properties xmlns:p="http://schemas.microsoft.com/office/2006/metadata/properties" xmlns:xsi="http://www.w3.org/2001/XMLSchema-instance" xmlns:pc="http://schemas.microsoft.com/office/infopath/2007/PartnerControls">
-  <documentManagement/>
-</p:properties>
+<file path=customXml/itemProps1.xml><?xml version="1.0" encoding="utf-8"?>
+<ds:datastoreItem xmlns:ds="http://schemas.openxmlformats.org/officeDocument/2006/customXml" ds:itemID="{4CB9D0C4-1816-48BB-B7D3-B65D006E1708}">
+  <ds:schemaRefs>
+    <ds:schemaRef ds:uri="http://schemas.microsoft.com/office/2006/metadata/properties"/>
+    <ds:schemaRef ds:uri="http://schemas.microsoft.com/office/infopath/2007/PartnerControls"/>
+  </ds:schemaRefs>
+</ds:datastoreItem>
 </file>
 
-<file path=customXml/itemProps1.xml><?xml version="1.0" encoding="utf-8"?>
+<file path=customXml/itemProps2.xml><?xml version="1.0" encoding="utf-8"?>
 <ds:datastoreItem xmlns:ds="http://schemas.openxmlformats.org/officeDocument/2006/customXml" ds:itemID="{86AFFBF5-1744-4DD8-AF35-1BECDBB21948}">
   <ds:schemaRefs>
     <ds:schemaRef ds:uri="http://schemas.microsoft.com/office/2006/metadata/contentType"/>
@@ -8446,19 +8656,10 @@
 </ds:datastoreItem>
 </file>
 
-<file path=customXml/itemProps2.xml><?xml version="1.0" encoding="utf-8"?>
+<file path=customXml/itemProps3.xml><?xml version="1.0" encoding="utf-8"?>
 <ds:datastoreItem xmlns:ds="http://schemas.openxmlformats.org/officeDocument/2006/customXml" ds:itemID="{91B7F2D7-28F4-40DC-BF4D-A63582936AC7}">
   <ds:schemaRefs>
     <ds:schemaRef ds:uri="http://schemas.microsoft.com/sharepoint/v3/contenttype/forms"/>
   </ds:schemaRefs>
 </ds:datastoreItem>
-</file>
-
-<file path=customXml/itemProps3.xml><?xml version="1.0" encoding="utf-8"?>
-<ds:datastoreItem xmlns:ds="http://schemas.openxmlformats.org/officeDocument/2006/customXml" ds:itemID="{4CB9D0C4-1816-48BB-B7D3-B65D006E1708}">
-  <ds:schemaRefs>
-    <ds:schemaRef ds:uri="http://schemas.microsoft.com/office/2006/metadata/properties"/>
-    <ds:schemaRef ds:uri="http://schemas.microsoft.com/office/infopath/2007/PartnerControls"/>
-  </ds:schemaRefs>
-</ds:datastoreItem>
 </file>
</xml_diff>